<commit_message>
[PERFECTIVE] Updated the final report slides.
</commit_message>
<xml_diff>
--- a/Administrative/Final Report Slides.pptx
+++ b/Administrative/Final Report Slides.pptx
@@ -5,24 +5,25 @@
     <p:sldMasterId id="2147483675" r:id="rId1"/>
   </p:sldMasterIdLst>
   <p:notesMasterIdLst>
-    <p:notesMasterId r:id="rId17"/>
+    <p:notesMasterId r:id="rId18"/>
   </p:notesMasterIdLst>
   <p:sldIdLst>
     <p:sldId id="257" r:id="rId2"/>
     <p:sldId id="258" r:id="rId3"/>
     <p:sldId id="271" r:id="rId4"/>
-    <p:sldId id="273" r:id="rId5"/>
-    <p:sldId id="279" r:id="rId6"/>
-    <p:sldId id="283" r:id="rId7"/>
-    <p:sldId id="274" r:id="rId8"/>
-    <p:sldId id="275" r:id="rId9"/>
-    <p:sldId id="280" r:id="rId10"/>
-    <p:sldId id="276" r:id="rId11"/>
-    <p:sldId id="277" r:id="rId12"/>
-    <p:sldId id="278" r:id="rId13"/>
-    <p:sldId id="272" r:id="rId14"/>
-    <p:sldId id="281" r:id="rId15"/>
-    <p:sldId id="282" r:id="rId16"/>
+    <p:sldId id="284" r:id="rId5"/>
+    <p:sldId id="273" r:id="rId6"/>
+    <p:sldId id="279" r:id="rId7"/>
+    <p:sldId id="283" r:id="rId8"/>
+    <p:sldId id="274" r:id="rId9"/>
+    <p:sldId id="275" r:id="rId10"/>
+    <p:sldId id="280" r:id="rId11"/>
+    <p:sldId id="276" r:id="rId12"/>
+    <p:sldId id="277" r:id="rId13"/>
+    <p:sldId id="278" r:id="rId14"/>
+    <p:sldId id="272" r:id="rId15"/>
+    <p:sldId id="281" r:id="rId16"/>
+    <p:sldId id="282" r:id="rId17"/>
   </p:sldIdLst>
   <p:sldSz cx="9144000" cy="6858000" type="screen4x3"/>
   <p:notesSz cx="7315200" cy="9601200"/>
@@ -341,11 +342,11 @@
           <c:showBubbleSize val="0"/>
         </c:dLbls>
         <c:gapWidth val="150"/>
-        <c:axId val="38549376"/>
-        <c:axId val="38767616"/>
+        <c:axId val="92465024"/>
+        <c:axId val="103391232"/>
       </c:barChart>
       <c:catAx>
-        <c:axId val="38549376"/>
+        <c:axId val="92465024"/>
         <c:scaling>
           <c:orientation val="minMax"/>
         </c:scaling>
@@ -373,7 +374,7 @@
         <c:majorTickMark val="out"/>
         <c:minorTickMark val="none"/>
         <c:tickLblPos val="nextTo"/>
-        <c:crossAx val="38767616"/>
+        <c:crossAx val="103391232"/>
         <c:crosses val="autoZero"/>
         <c:auto val="1"/>
         <c:lblAlgn val="ctr"/>
@@ -381,7 +382,7 @@
         <c:noMultiLvlLbl val="0"/>
       </c:catAx>
       <c:valAx>
-        <c:axId val="38767616"/>
+        <c:axId val="103391232"/>
         <c:scaling>
           <c:orientation val="minMax"/>
         </c:scaling>
@@ -411,7 +412,7 @@
         <c:majorTickMark val="out"/>
         <c:minorTickMark val="none"/>
         <c:tickLblPos val="nextTo"/>
-        <c:crossAx val="38549376"/>
+        <c:crossAx val="92465024"/>
         <c:crosses val="autoZero"/>
         <c:crossBetween val="between"/>
       </c:valAx>
@@ -699,11 +700,11 @@
           <c:showBubbleSize val="0"/>
         </c:dLbls>
         <c:gapWidth val="150"/>
-        <c:axId val="38550144"/>
-        <c:axId val="39102720"/>
+        <c:axId val="103296000"/>
+        <c:axId val="103298176"/>
       </c:barChart>
       <c:catAx>
-        <c:axId val="38550144"/>
+        <c:axId val="103296000"/>
         <c:scaling>
           <c:orientation val="minMax"/>
         </c:scaling>
@@ -731,7 +732,7 @@
         <c:majorTickMark val="none"/>
         <c:minorTickMark val="none"/>
         <c:tickLblPos val="nextTo"/>
-        <c:crossAx val="39102720"/>
+        <c:crossAx val="103298176"/>
         <c:crosses val="autoZero"/>
         <c:auto val="1"/>
         <c:lblAlgn val="ctr"/>
@@ -739,7 +740,7 @@
         <c:noMultiLvlLbl val="0"/>
       </c:catAx>
       <c:valAx>
-        <c:axId val="39102720"/>
+        <c:axId val="103298176"/>
         <c:scaling>
           <c:orientation val="minMax"/>
         </c:scaling>
@@ -769,7 +770,7 @@
         <c:majorTickMark val="none"/>
         <c:minorTickMark val="none"/>
         <c:tickLblPos val="nextTo"/>
-        <c:crossAx val="38550144"/>
+        <c:crossAx val="103296000"/>
         <c:crosses val="autoZero"/>
         <c:crossBetween val="between"/>
       </c:valAx>
@@ -872,7 +873,7 @@
             <a:fld id="{448AE8FB-2A88-455E-B24C-E27AB594F61E}" type="datetimeFigureOut">
               <a:rPr lang="en-US" smtClean="0"/>
               <a:pPr/>
-              <a:t>4/26/2013</a:t>
+              <a:t>4/30/2013</a:t>
             </a:fld>
             <a:endParaRPr lang="en-US"/>
           </a:p>
@@ -1291,7 +1292,7 @@
             <a:fld id="{44EA5208-97E8-43FA-B797-BFAC77D15B1E}" type="slidenum">
               <a:rPr lang="en-US" smtClean="0"/>
               <a:pPr/>
-              <a:t>4</a:t>
+              <a:t>5</a:t>
             </a:fld>
             <a:endParaRPr lang="en-US"/>
           </a:p>
@@ -5434,14 +5435,105 @@
           <a:lstStyle/>
           <a:p>
             <a:r>
+              <a:rPr lang="fi-FI" dirty="0" err="1" smtClean="0"/>
+              <a:t>Realized</a:t>
+            </a:r>
+            <a:r>
               <a:rPr lang="fi-FI" dirty="0" smtClean="0"/>
-              <a:t>Time </a:t>
+              <a:t> </a:t>
             </a:r>
             <a:r>
               <a:rPr lang="fi-FI" dirty="0" err="1" smtClean="0"/>
-              <a:t>Usage</a:t>
+              <a:t>Risks</a:t>
             </a:r>
             <a:endParaRPr lang="en-US" dirty="0"/>
+          </a:p>
+        </p:txBody>
+      </p:sp>
+      <p:sp>
+        <p:nvSpPr>
+          <p:cNvPr id="6" name="Content Placeholder 5"/>
+          <p:cNvSpPr>
+            <a:spLocks noGrp="1"/>
+          </p:cNvSpPr>
+          <p:nvPr>
+            <p:ph idx="1"/>
+          </p:nvPr>
+        </p:nvSpPr>
+        <p:spPr/>
+        <p:txBody>
+          <a:bodyPr>
+            <a:normAutofit/>
+          </a:bodyPr>
+          <a:lstStyle/>
+          <a:p>
+            <a:r>
+              <a:rPr lang="en-US" dirty="0" smtClean="0"/>
+              <a:t>Sickness</a:t>
+            </a:r>
+          </a:p>
+          <a:p>
+            <a:pPr lvl="1"/>
+            <a:r>
+              <a:rPr lang="en-US" dirty="0" smtClean="0">
+                <a:sym typeface="Wingdings" pitchFamily="2" charset="2"/>
+              </a:rPr>
+              <a:t>Caused one week delay which was compensated later on</a:t>
+            </a:r>
+          </a:p>
+          <a:p>
+            <a:r>
+              <a:rPr lang="en-US" dirty="0" smtClean="0">
+                <a:sym typeface="Wingdings" pitchFamily="2" charset="2"/>
+              </a:rPr>
+              <a:t>Development server downtime</a:t>
+            </a:r>
+          </a:p>
+          <a:p>
+            <a:pPr lvl="1"/>
+            <a:r>
+              <a:rPr lang="en-US" dirty="0" err="1" smtClean="0">
+                <a:sym typeface="Wingdings" pitchFamily="2" charset="2"/>
+              </a:rPr>
+              <a:t>Sourceforge</a:t>
+            </a:r>
+            <a:r>
+              <a:rPr lang="en-US" dirty="0" smtClean="0">
+                <a:sym typeface="Wingdings" pitchFamily="2" charset="2"/>
+              </a:rPr>
+              <a:t> (version control) was temporarily down</a:t>
+            </a:r>
+          </a:p>
+          <a:p>
+            <a:pPr lvl="1"/>
+            <a:r>
+              <a:rPr lang="en-US" dirty="0" smtClean="0">
+                <a:sym typeface="Wingdings" pitchFamily="2" charset="2"/>
+              </a:rPr>
+              <a:t>Hostedredmine.com (project management) was down</a:t>
+            </a:r>
+          </a:p>
+          <a:p>
+            <a:pPr lvl="1"/>
+            <a:r>
+              <a:rPr lang="en-US" dirty="0" smtClean="0">
+                <a:sym typeface="Wingdings" pitchFamily="2" charset="2"/>
+              </a:rPr>
+              <a:t>No severe effects</a:t>
+            </a:r>
+          </a:p>
+          <a:p>
+            <a:endParaRPr lang="en-US" dirty="0">
+              <a:sym typeface="Wingdings" pitchFamily="2" charset="2"/>
+            </a:endParaRPr>
+          </a:p>
+          <a:p>
+            <a:pPr marL="0" indent="0">
+              <a:buNone/>
+            </a:pPr>
+            <a:endParaRPr lang="fi-FI" dirty="0" smtClean="0">
+              <a:sym typeface="Wingdings" pitchFamily="2" charset="2"/>
+            </a:endParaRPr>
           </a:p>
         </p:txBody>
       </p:sp>
@@ -5464,6 +5556,97 @@
               <a:rPr lang="fi-FI" smtClean="0"/>
               <a:pPr/>
               <a:t>10</a:t>
+            </a:fld>
+            <a:endParaRPr lang="fi-FI" dirty="0"/>
+          </a:p>
+        </p:txBody>
+      </p:sp>
+    </p:spTree>
+    <p:extLst>
+      <p:ext uri="{BB962C8B-B14F-4D97-AF65-F5344CB8AC3E}">
+        <p14:creationId xmlns:p14="http://schemas.microsoft.com/office/powerpoint/2010/main" val="1961641194"/>
+      </p:ext>
+    </p:extLst>
+  </p:cSld>
+  <p:clrMapOvr>
+    <a:masterClrMapping/>
+  </p:clrMapOvr>
+  <p:transition>
+    <p:zoom/>
+  </p:transition>
+  <p:timing>
+    <p:tnLst>
+      <p:par>
+        <p:cTn id="1" dur="indefinite" restart="never" nodeType="tmRoot"/>
+      </p:par>
+    </p:tnLst>
+  </p:timing>
+</p:sld>
+</file>
+
+<file path=ppt/slides/slide11.xml><?xml version="1.0" encoding="utf-8"?>
+<p:sld xmlns:a="http://schemas.openxmlformats.org/drawingml/2006/main" xmlns:r="http://schemas.openxmlformats.org/officeDocument/2006/relationships" xmlns:p="http://schemas.openxmlformats.org/presentationml/2006/main">
+  <p:cSld>
+    <p:spTree>
+      <p:nvGrpSpPr>
+        <p:cNvPr id="1" name=""/>
+        <p:cNvGrpSpPr/>
+        <p:nvPr/>
+      </p:nvGrpSpPr>
+      <p:grpSpPr>
+        <a:xfrm>
+          <a:off x="0" y="0"/>
+          <a:ext cx="0" cy="0"/>
+          <a:chOff x="0" y="0"/>
+          <a:chExt cx="0" cy="0"/>
+        </a:xfrm>
+      </p:grpSpPr>
+      <p:sp>
+        <p:nvSpPr>
+          <p:cNvPr id="5" name="Title 4"/>
+          <p:cNvSpPr>
+            <a:spLocks noGrp="1"/>
+          </p:cNvSpPr>
+          <p:nvPr>
+            <p:ph type="title"/>
+          </p:nvPr>
+        </p:nvSpPr>
+        <p:spPr/>
+        <p:txBody>
+          <a:bodyPr/>
+          <a:lstStyle/>
+          <a:p>
+            <a:r>
+              <a:rPr lang="fi-FI" dirty="0" smtClean="0"/>
+              <a:t>Time </a:t>
+            </a:r>
+            <a:r>
+              <a:rPr lang="fi-FI" dirty="0" err="1" smtClean="0"/>
+              <a:t>Usage</a:t>
+            </a:r>
+            <a:endParaRPr lang="en-US" dirty="0"/>
+          </a:p>
+        </p:txBody>
+      </p:sp>
+      <p:sp>
+        <p:nvSpPr>
+          <p:cNvPr id="4" name="Slide Number Placeholder 3"/>
+          <p:cNvSpPr>
+            <a:spLocks noGrp="1"/>
+          </p:cNvSpPr>
+          <p:nvPr>
+            <p:ph type="sldNum" sz="quarter" idx="11"/>
+          </p:nvPr>
+        </p:nvSpPr>
+        <p:spPr/>
+        <p:txBody>
+          <a:bodyPr/>
+          <a:lstStyle/>
+          <a:p>
+            <a:fld id="{396A2528-BFCE-4DA1-8CA6-E7CCE78C7A79}" type="slidenum">
+              <a:rPr lang="fi-FI" smtClean="0"/>
+              <a:pPr/>
+              <a:t>11</a:t>
             </a:fld>
             <a:endParaRPr lang="fi-FI" dirty="0"/>
           </a:p>
@@ -5516,7 +5699,7 @@
 </p:sld>
 </file>
 
-<file path=ppt/slides/slide11.xml><?xml version="1.0" encoding="utf-8"?>
+<file path=ppt/slides/slide12.xml><?xml version="1.0" encoding="utf-8"?>
 <p:sld xmlns:a="http://schemas.openxmlformats.org/drawingml/2006/main" xmlns:r="http://schemas.openxmlformats.org/officeDocument/2006/relationships" xmlns:p="http://schemas.openxmlformats.org/presentationml/2006/main">
   <p:cSld>
     <p:spTree>
@@ -5578,7 +5761,7 @@
             <a:fld id="{396A2528-BFCE-4DA1-8CA6-E7CCE78C7A79}" type="slidenum">
               <a:rPr lang="fi-FI" smtClean="0"/>
               <a:pPr/>
-              <a:t>11</a:t>
+              <a:t>12</a:t>
             </a:fld>
             <a:endParaRPr lang="fi-FI" dirty="0"/>
           </a:p>
@@ -5631,310 +5814,6 @@
 </p:sld>
 </file>
 
-<file path=ppt/slides/slide12.xml><?xml version="1.0" encoding="utf-8"?>
-<p:sld xmlns:a="http://schemas.openxmlformats.org/drawingml/2006/main" xmlns:r="http://schemas.openxmlformats.org/officeDocument/2006/relationships" xmlns:p="http://schemas.openxmlformats.org/presentationml/2006/main">
-  <p:cSld>
-    <p:spTree>
-      <p:nvGrpSpPr>
-        <p:cNvPr id="1" name=""/>
-        <p:cNvGrpSpPr/>
-        <p:nvPr/>
-      </p:nvGrpSpPr>
-      <p:grpSpPr>
-        <a:xfrm>
-          <a:off x="0" y="0"/>
-          <a:ext cx="0" cy="0"/>
-          <a:chOff x="0" y="0"/>
-          <a:chExt cx="0" cy="0"/>
-        </a:xfrm>
-      </p:grpSpPr>
-      <p:sp>
-        <p:nvSpPr>
-          <p:cNvPr id="5" name="Title 4"/>
-          <p:cNvSpPr>
-            <a:spLocks noGrp="1"/>
-          </p:cNvSpPr>
-          <p:nvPr>
-            <p:ph type="title"/>
-          </p:nvPr>
-        </p:nvSpPr>
-        <p:spPr/>
-        <p:txBody>
-          <a:bodyPr/>
-          <a:lstStyle/>
-          <a:p>
-            <a:r>
-              <a:rPr lang="fi-FI" dirty="0" err="1" smtClean="0"/>
-              <a:t>What</a:t>
-            </a:r>
-            <a:r>
-              <a:rPr lang="fi-FI" dirty="0" smtClean="0"/>
-              <a:t> </a:t>
-            </a:r>
-            <a:r>
-              <a:rPr lang="fi-FI" dirty="0" err="1" smtClean="0"/>
-              <a:t>did</a:t>
-            </a:r>
-            <a:r>
-              <a:rPr lang="fi-FI" dirty="0" smtClean="0"/>
-              <a:t> </a:t>
-            </a:r>
-            <a:r>
-              <a:rPr lang="fi-FI" dirty="0" err="1" smtClean="0"/>
-              <a:t>we</a:t>
-            </a:r>
-            <a:r>
-              <a:rPr lang="fi-FI" dirty="0" smtClean="0"/>
-              <a:t> </a:t>
-            </a:r>
-            <a:r>
-              <a:rPr lang="fi-FI" dirty="0" err="1" smtClean="0"/>
-              <a:t>learn</a:t>
-            </a:r>
-            <a:r>
-              <a:rPr lang="fi-FI" dirty="0" smtClean="0"/>
-              <a:t>?</a:t>
-            </a:r>
-            <a:endParaRPr lang="en-US" dirty="0"/>
-          </a:p>
-        </p:txBody>
-      </p:sp>
-      <p:sp>
-        <p:nvSpPr>
-          <p:cNvPr id="6" name="Content Placeholder 5"/>
-          <p:cNvSpPr>
-            <a:spLocks noGrp="1"/>
-          </p:cNvSpPr>
-          <p:nvPr>
-            <p:ph idx="1"/>
-          </p:nvPr>
-        </p:nvSpPr>
-        <p:spPr/>
-        <p:txBody>
-          <a:bodyPr>
-            <a:normAutofit/>
-          </a:bodyPr>
-          <a:lstStyle/>
-          <a:p>
-            <a:r>
-              <a:rPr lang="en-US" sz="2800" dirty="0" smtClean="0"/>
-              <a:t>Scheduling is difficult</a:t>
-            </a:r>
-          </a:p>
-          <a:p>
-            <a:pPr lvl="1"/>
-            <a:r>
-              <a:rPr lang="en-US" sz="2400" dirty="0" smtClean="0"/>
-              <a:t>Especially when using libraries you don’t know inside out</a:t>
-            </a:r>
-          </a:p>
-          <a:p>
-            <a:pPr lvl="1"/>
-            <a:r>
-              <a:rPr lang="fi-FI" sz="2400" dirty="0" err="1" smtClean="0"/>
-              <a:t>It</a:t>
-            </a:r>
-            <a:r>
-              <a:rPr lang="fi-FI" sz="2400" dirty="0" smtClean="0"/>
-              <a:t> is </a:t>
-            </a:r>
-            <a:r>
-              <a:rPr lang="fi-FI" sz="2400" dirty="0" err="1" smtClean="0"/>
-              <a:t>better</a:t>
-            </a:r>
-            <a:r>
-              <a:rPr lang="fi-FI" sz="2400" dirty="0" smtClean="0"/>
-              <a:t> to </a:t>
-            </a:r>
-            <a:r>
-              <a:rPr lang="fi-FI" sz="2400" dirty="0" err="1" smtClean="0"/>
-              <a:t>overestimate</a:t>
-            </a:r>
-            <a:r>
-              <a:rPr lang="fi-FI" sz="2400" dirty="0" smtClean="0"/>
-              <a:t> </a:t>
-            </a:r>
-            <a:r>
-              <a:rPr lang="fi-FI" sz="2400" dirty="0" err="1" smtClean="0"/>
-              <a:t>than</a:t>
-            </a:r>
-            <a:r>
-              <a:rPr lang="fi-FI" sz="2400" dirty="0" smtClean="0"/>
-              <a:t> to </a:t>
-            </a:r>
-            <a:r>
-              <a:rPr lang="fi-FI" sz="2400" dirty="0" err="1" smtClean="0"/>
-              <a:t>underestimate</a:t>
-            </a:r>
-            <a:endParaRPr lang="fi-FI" sz="2400" dirty="0" smtClean="0"/>
-          </a:p>
-          <a:p>
-            <a:pPr lvl="2"/>
-            <a:r>
-              <a:rPr lang="fi-FI" sz="2000" dirty="0" err="1" smtClean="0"/>
-              <a:t>Although</a:t>
-            </a:r>
-            <a:r>
-              <a:rPr lang="fi-FI" sz="2000" dirty="0" smtClean="0"/>
-              <a:t> </a:t>
-            </a:r>
-            <a:r>
-              <a:rPr lang="fi-FI" sz="2000" dirty="0" err="1" smtClean="0"/>
-              <a:t>overestimation</a:t>
-            </a:r>
-            <a:r>
-              <a:rPr lang="fi-FI" sz="2000" dirty="0" smtClean="0"/>
-              <a:t> is </a:t>
-            </a:r>
-            <a:r>
-              <a:rPr lang="fi-FI" sz="2000" dirty="0" err="1" smtClean="0"/>
-              <a:t>not</a:t>
-            </a:r>
-            <a:r>
-              <a:rPr lang="fi-FI" sz="2000" dirty="0" smtClean="0"/>
-              <a:t> </a:t>
-            </a:r>
-            <a:r>
-              <a:rPr lang="fi-FI" sz="2000" dirty="0" err="1" smtClean="0"/>
-              <a:t>good</a:t>
-            </a:r>
-            <a:r>
-              <a:rPr lang="fi-FI" sz="2000" dirty="0" smtClean="0"/>
-              <a:t> </a:t>
-            </a:r>
-            <a:r>
-              <a:rPr lang="fi-FI" sz="2000" dirty="0" err="1" smtClean="0"/>
-              <a:t>either</a:t>
-            </a:r>
-            <a:endParaRPr lang="en-US" sz="2000" dirty="0" smtClean="0"/>
-          </a:p>
-          <a:p>
-            <a:r>
-              <a:rPr lang="en-US" sz="2800" dirty="0" smtClean="0"/>
-              <a:t>Don’t reinvent the wheel</a:t>
-            </a:r>
-          </a:p>
-          <a:p>
-            <a:pPr lvl="1"/>
-            <a:r>
-              <a:rPr lang="en-US" sz="2400" dirty="0" smtClean="0"/>
-              <a:t>30 minutes of research can save hours of work</a:t>
-            </a:r>
-          </a:p>
-          <a:p>
-            <a:pPr lvl="1"/>
-            <a:r>
-              <a:rPr lang="en-US" sz="2400" dirty="0" err="1" smtClean="0"/>
-              <a:t>Reimplementing</a:t>
-            </a:r>
-            <a:r>
-              <a:rPr lang="en-US" sz="2400" dirty="0" smtClean="0"/>
-              <a:t> an algorithm in a different language is much simpler than figuring it out</a:t>
-            </a:r>
-          </a:p>
-          <a:p>
-            <a:pPr lvl="1"/>
-            <a:r>
-              <a:rPr lang="en-US" sz="2400" dirty="0" smtClean="0"/>
-              <a:t>In this project: saved over 80 hours of work</a:t>
-            </a:r>
-          </a:p>
-          <a:p>
-            <a:r>
-              <a:rPr lang="fi-FI" sz="2800" dirty="0" err="1" smtClean="0"/>
-              <a:t>Not</a:t>
-            </a:r>
-            <a:r>
-              <a:rPr lang="fi-FI" sz="2800" dirty="0" smtClean="0"/>
-              <a:t> </a:t>
-            </a:r>
-            <a:r>
-              <a:rPr lang="fi-FI" sz="2800" dirty="0" err="1" smtClean="0"/>
-              <a:t>all</a:t>
-            </a:r>
-            <a:r>
-              <a:rPr lang="fi-FI" sz="2800" dirty="0" smtClean="0"/>
-              <a:t> </a:t>
-            </a:r>
-            <a:r>
-              <a:rPr lang="fi-FI" sz="2800" dirty="0" err="1" smtClean="0"/>
-              <a:t>projects</a:t>
-            </a:r>
-            <a:r>
-              <a:rPr lang="fi-FI" sz="2800" dirty="0" smtClean="0"/>
-              <a:t> </a:t>
-            </a:r>
-            <a:r>
-              <a:rPr lang="fi-FI" sz="2800" dirty="0" err="1" smtClean="0"/>
-              <a:t>are</a:t>
-            </a:r>
-            <a:r>
-              <a:rPr lang="fi-FI" sz="2800" dirty="0" smtClean="0"/>
-              <a:t> </a:t>
-            </a:r>
-            <a:r>
-              <a:rPr lang="fi-FI" sz="2800" dirty="0" err="1" smtClean="0"/>
-              <a:t>full</a:t>
-            </a:r>
-            <a:r>
-              <a:rPr lang="fi-FI" sz="2800" dirty="0" smtClean="0"/>
-              <a:t> of </a:t>
-            </a:r>
-            <a:r>
-              <a:rPr lang="fi-FI" sz="2800" dirty="0" err="1" smtClean="0"/>
-              <a:t>problems</a:t>
-            </a:r>
-            <a:endParaRPr lang="en-US" sz="2800" dirty="0" smtClean="0"/>
-          </a:p>
-        </p:txBody>
-      </p:sp>
-      <p:sp>
-        <p:nvSpPr>
-          <p:cNvPr id="4" name="Slide Number Placeholder 3"/>
-          <p:cNvSpPr>
-            <a:spLocks noGrp="1"/>
-          </p:cNvSpPr>
-          <p:nvPr>
-            <p:ph type="sldNum" sz="quarter" idx="11"/>
-          </p:nvPr>
-        </p:nvSpPr>
-        <p:spPr/>
-        <p:txBody>
-          <a:bodyPr/>
-          <a:lstStyle/>
-          <a:p>
-            <a:fld id="{396A2528-BFCE-4DA1-8CA6-E7CCE78C7A79}" type="slidenum">
-              <a:rPr lang="fi-FI" smtClean="0"/>
-              <a:pPr/>
-              <a:t>12</a:t>
-            </a:fld>
-            <a:endParaRPr lang="fi-FI" dirty="0"/>
-          </a:p>
-        </p:txBody>
-      </p:sp>
-    </p:spTree>
-    <p:extLst>
-      <p:ext uri="{BB962C8B-B14F-4D97-AF65-F5344CB8AC3E}">
-        <p14:creationId xmlns:p14="http://schemas.microsoft.com/office/powerpoint/2010/main" val="1850462584"/>
-      </p:ext>
-    </p:extLst>
-  </p:cSld>
-  <p:clrMapOvr>
-    <a:masterClrMapping/>
-  </p:clrMapOvr>
-  <p:transition>
-    <p:zoom/>
-  </p:transition>
-  <p:timing>
-    <p:tnLst>
-      <p:par>
-        <p:cTn id="1" dur="indefinite" restart="never" nodeType="tmRoot"/>
-      </p:par>
-    </p:tnLst>
-  </p:timing>
-</p:sld>
-</file>
-
 <file path=ppt/slides/slide13.xml><?xml version="1.0" encoding="utf-8"?>
 <p:sld xmlns:a="http://schemas.openxmlformats.org/drawingml/2006/main" xmlns:r="http://schemas.openxmlformats.org/officeDocument/2006/relationships" xmlns:p="http://schemas.openxmlformats.org/presentationml/2006/main">
   <p:cSld>
@@ -5969,7 +5848,35 @@
           <a:p>
             <a:r>
               <a:rPr lang="fi-FI" dirty="0" err="1" smtClean="0"/>
-              <a:t>Conclusion</a:t>
+              <a:t>What</a:t>
+            </a:r>
+            <a:r>
+              <a:rPr lang="fi-FI" dirty="0" smtClean="0"/>
+              <a:t> </a:t>
+            </a:r>
+            <a:r>
+              <a:rPr lang="fi-FI" dirty="0" err="1" smtClean="0"/>
+              <a:t>did</a:t>
+            </a:r>
+            <a:r>
+              <a:rPr lang="fi-FI" dirty="0" smtClean="0"/>
+              <a:t> </a:t>
+            </a:r>
+            <a:r>
+              <a:rPr lang="fi-FI" dirty="0" err="1" smtClean="0"/>
+              <a:t>we</a:t>
+            </a:r>
+            <a:r>
+              <a:rPr lang="fi-FI" dirty="0" smtClean="0"/>
+              <a:t> </a:t>
+            </a:r>
+            <a:r>
+              <a:rPr lang="fi-FI" dirty="0" err="1" smtClean="0"/>
+              <a:t>learn</a:t>
+            </a:r>
+            <a:r>
+              <a:rPr lang="fi-FI" dirty="0" smtClean="0"/>
+              <a:t>?</a:t>
             </a:r>
             <a:endParaRPr lang="en-US" dirty="0"/>
           </a:p>
@@ -5988,17 +5895,137 @@
         <p:spPr/>
         <p:txBody>
           <a:bodyPr>
-            <a:noAutofit/>
+            <a:normAutofit/>
           </a:bodyPr>
           <a:lstStyle/>
           <a:p>
             <a:r>
-              <a:rPr lang="fi-FI" sz="2800" dirty="0" smtClean="0"/>
-              <a:t>The </a:t>
-            </a:r>
+              <a:rPr lang="en-US" sz="2800" dirty="0" smtClean="0"/>
+              <a:t>Scheduling is difficult</a:t>
+            </a:r>
+          </a:p>
+          <a:p>
+            <a:pPr lvl="1"/>
+            <a:r>
+              <a:rPr lang="en-US" sz="2400" dirty="0" smtClean="0"/>
+              <a:t>Especially when using libraries you don’t know inside out</a:t>
+            </a:r>
+          </a:p>
+          <a:p>
+            <a:pPr lvl="1"/>
+            <a:r>
+              <a:rPr lang="fi-FI" sz="2400" dirty="0" err="1" smtClean="0"/>
+              <a:t>It</a:t>
+            </a:r>
+            <a:r>
+              <a:rPr lang="fi-FI" sz="2400" dirty="0" smtClean="0"/>
+              <a:t> is </a:t>
+            </a:r>
+            <a:r>
+              <a:rPr lang="fi-FI" sz="2400" dirty="0" err="1" smtClean="0"/>
+              <a:t>better</a:t>
+            </a:r>
+            <a:r>
+              <a:rPr lang="fi-FI" sz="2400" dirty="0" smtClean="0"/>
+              <a:t> to </a:t>
+            </a:r>
+            <a:r>
+              <a:rPr lang="fi-FI" sz="2400" dirty="0" err="1" smtClean="0"/>
+              <a:t>overestimate</a:t>
+            </a:r>
+            <a:r>
+              <a:rPr lang="fi-FI" sz="2400" dirty="0" smtClean="0"/>
+              <a:t> </a:t>
+            </a:r>
+            <a:r>
+              <a:rPr lang="fi-FI" sz="2400" dirty="0" err="1" smtClean="0"/>
+              <a:t>than</a:t>
+            </a:r>
+            <a:r>
+              <a:rPr lang="fi-FI" sz="2400" dirty="0" smtClean="0"/>
+              <a:t> to </a:t>
+            </a:r>
+            <a:r>
+              <a:rPr lang="fi-FI" sz="2400" dirty="0" err="1" smtClean="0"/>
+              <a:t>underestimate</a:t>
+            </a:r>
+            <a:endParaRPr lang="fi-FI" sz="2400" dirty="0" smtClean="0"/>
+          </a:p>
+          <a:p>
+            <a:pPr lvl="2"/>
+            <a:r>
+              <a:rPr lang="fi-FI" sz="2000" dirty="0" err="1" smtClean="0"/>
+              <a:t>Although</a:t>
+            </a:r>
+            <a:r>
+              <a:rPr lang="fi-FI" sz="2000" dirty="0" smtClean="0"/>
+              <a:t> </a:t>
+            </a:r>
+            <a:r>
+              <a:rPr lang="fi-FI" sz="2000" dirty="0" err="1" smtClean="0"/>
+              <a:t>overestimation</a:t>
+            </a:r>
+            <a:r>
+              <a:rPr lang="fi-FI" sz="2000" dirty="0" smtClean="0"/>
+              <a:t> is </a:t>
+            </a:r>
+            <a:r>
+              <a:rPr lang="fi-FI" sz="2000" dirty="0" err="1" smtClean="0"/>
+              <a:t>not</a:t>
+            </a:r>
+            <a:r>
+              <a:rPr lang="fi-FI" sz="2000" dirty="0" smtClean="0"/>
+              <a:t> </a:t>
+            </a:r>
+            <a:r>
+              <a:rPr lang="fi-FI" sz="2000" dirty="0" err="1" smtClean="0"/>
+              <a:t>good</a:t>
+            </a:r>
+            <a:r>
+              <a:rPr lang="fi-FI" sz="2000" dirty="0" smtClean="0"/>
+              <a:t> </a:t>
+            </a:r>
+            <a:r>
+              <a:rPr lang="fi-FI" sz="2000" dirty="0" err="1" smtClean="0"/>
+              <a:t>either</a:t>
+            </a:r>
+            <a:endParaRPr lang="en-US" sz="2000" dirty="0" smtClean="0"/>
+          </a:p>
+          <a:p>
+            <a:r>
+              <a:rPr lang="en-US" sz="2800" dirty="0" smtClean="0"/>
+              <a:t>Don’t reinvent the wheel</a:t>
+            </a:r>
+          </a:p>
+          <a:p>
+            <a:pPr lvl="1"/>
+            <a:r>
+              <a:rPr lang="en-US" sz="2400" dirty="0" smtClean="0"/>
+              <a:t>30 minutes of research can save hours of work</a:t>
+            </a:r>
+          </a:p>
+          <a:p>
+            <a:pPr lvl="1"/>
+            <a:r>
+              <a:rPr lang="en-US" sz="2400" dirty="0" err="1" smtClean="0"/>
+              <a:t>Reimplementing</a:t>
+            </a:r>
+            <a:r>
+              <a:rPr lang="en-US" sz="2400" dirty="0" smtClean="0"/>
+              <a:t> an algorithm in a different language is much simpler than figuring it out</a:t>
+            </a:r>
+          </a:p>
+          <a:p>
+            <a:pPr lvl="1"/>
+            <a:r>
+              <a:rPr lang="en-US" sz="2400" dirty="0" smtClean="0"/>
+              <a:t>In this project: saved over 80 hours of work</a:t>
+            </a:r>
+          </a:p>
+          <a:p>
             <a:r>
               <a:rPr lang="fi-FI" sz="2800" dirty="0" err="1" smtClean="0"/>
-              <a:t>project</a:t>
+              <a:t>Not</a:t>
             </a:r>
             <a:r>
               <a:rPr lang="fi-FI" sz="2800" dirty="0" smtClean="0"/>
@@ -6006,7 +6033,7 @@
             </a:r>
             <a:r>
               <a:rPr lang="fi-FI" sz="2800" dirty="0" err="1" smtClean="0"/>
-              <a:t>was</a:t>
+              <a:t>all</a:t>
             </a:r>
             <a:r>
               <a:rPr lang="fi-FI" sz="2800" dirty="0" smtClean="0"/>
@@ -6014,126 +6041,7 @@
             </a:r>
             <a:r>
               <a:rPr lang="fi-FI" sz="2800" dirty="0" err="1" smtClean="0"/>
-              <a:t>successful</a:t>
-            </a:r>
-            <a:endParaRPr lang="fi-FI" sz="2800" dirty="0" smtClean="0"/>
-          </a:p>
-          <a:p>
-            <a:pPr lvl="1"/>
-            <a:r>
-              <a:rPr lang="fi-FI" sz="2400" dirty="0" smtClean="0"/>
-              <a:t>The </a:t>
-            </a:r>
-            <a:r>
-              <a:rPr lang="fi-FI" sz="2400" dirty="0" err="1" smtClean="0"/>
-              <a:t>first</a:t>
-            </a:r>
-            <a:r>
-              <a:rPr lang="fi-FI" sz="2400" dirty="0" smtClean="0"/>
-              <a:t> </a:t>
-            </a:r>
-            <a:r>
-              <a:rPr lang="fi-FI" sz="2400" dirty="0" err="1" smtClean="0"/>
-              <a:t>fully</a:t>
-            </a:r>
-            <a:r>
-              <a:rPr lang="fi-FI" sz="2400" dirty="0" smtClean="0"/>
-              <a:t> </a:t>
-            </a:r>
-            <a:r>
-              <a:rPr lang="fi-FI" sz="2400" dirty="0" err="1" smtClean="0"/>
-              <a:t>function</a:t>
-            </a:r>
-            <a:r>
-              <a:rPr lang="fi-FI" sz="2400" dirty="0" err="1" smtClean="0"/>
-              <a:t>al</a:t>
-            </a:r>
-            <a:r>
-              <a:rPr lang="fi-FI" sz="2400" dirty="0" smtClean="0"/>
-              <a:t> version of the </a:t>
-            </a:r>
-            <a:r>
-              <a:rPr lang="fi-FI" sz="2400" dirty="0" err="1" smtClean="0"/>
-              <a:t>tool</a:t>
-            </a:r>
-            <a:r>
-              <a:rPr lang="fi-FI" sz="2400" dirty="0" smtClean="0"/>
-              <a:t> </a:t>
-            </a:r>
-            <a:r>
-              <a:rPr lang="fi-FI" sz="2400" dirty="0" err="1" smtClean="0"/>
-              <a:t>was</a:t>
-            </a:r>
-            <a:r>
-              <a:rPr lang="fi-FI" sz="2400" dirty="0" smtClean="0"/>
-              <a:t> </a:t>
-            </a:r>
-            <a:r>
-              <a:rPr lang="fi-FI" sz="2400" dirty="0" err="1" smtClean="0"/>
-              <a:t>finished</a:t>
-            </a:r>
-            <a:endParaRPr lang="fi-FI" sz="2400" dirty="0" smtClean="0"/>
-          </a:p>
-          <a:p>
-            <a:pPr lvl="1"/>
-            <a:r>
-              <a:rPr lang="fi-FI" sz="2400" dirty="0" err="1" smtClean="0"/>
-              <a:t>All</a:t>
-            </a:r>
-            <a:r>
-              <a:rPr lang="fi-FI" sz="2400" dirty="0" smtClean="0"/>
-              <a:t> </a:t>
-            </a:r>
-            <a:r>
-              <a:rPr lang="fi-FI" sz="2400" dirty="0" err="1" smtClean="0"/>
-              <a:t>members</a:t>
-            </a:r>
-            <a:r>
-              <a:rPr lang="fi-FI" sz="2400" dirty="0" smtClean="0"/>
-              <a:t> </a:t>
-            </a:r>
-            <a:r>
-              <a:rPr lang="fi-FI" sz="2400" dirty="0" err="1" smtClean="0"/>
-              <a:t>are</a:t>
-            </a:r>
-            <a:r>
-              <a:rPr lang="fi-FI" sz="2400" dirty="0" smtClean="0"/>
-              <a:t> </a:t>
-            </a:r>
-            <a:r>
-              <a:rPr lang="fi-FI" sz="2400" dirty="0" err="1" smtClean="0"/>
-              <a:t>now</a:t>
-            </a:r>
-            <a:r>
-              <a:rPr lang="fi-FI" sz="2400" dirty="0" smtClean="0"/>
-              <a:t> </a:t>
-            </a:r>
-            <a:r>
-              <a:rPr lang="fi-FI" sz="2400" dirty="0" err="1" smtClean="0"/>
-              <a:t>familiar</a:t>
-            </a:r>
-            <a:r>
-              <a:rPr lang="fi-FI" sz="2400" dirty="0" smtClean="0"/>
-              <a:t> with </a:t>
-            </a:r>
-            <a:r>
-              <a:rPr lang="fi-FI" sz="2400" dirty="0" err="1" smtClean="0"/>
-              <a:t>Qt</a:t>
-            </a:r>
-            <a:r>
-              <a:rPr lang="fi-FI" sz="2400" dirty="0" smtClean="0"/>
-              <a:t> </a:t>
-            </a:r>
-            <a:r>
-              <a:rPr lang="fi-FI" sz="2400" dirty="0" err="1" smtClean="0"/>
-              <a:t>development</a:t>
-            </a:r>
-            <a:endParaRPr lang="fi-FI" sz="2400" dirty="0"/>
-          </a:p>
-          <a:p>
-            <a:r>
-              <a:rPr lang="fi-FI" sz="2800" dirty="0" err="1" smtClean="0"/>
-              <a:t>Next</a:t>
+              <a:t>projects</a:t>
             </a:r>
             <a:r>
               <a:rPr lang="fi-FI" sz="2800" dirty="0" smtClean="0"/>
@@ -6141,7 +6049,7 @@
             </a:r>
             <a:r>
               <a:rPr lang="fi-FI" sz="2800" dirty="0" err="1" smtClean="0"/>
-              <a:t>steps</a:t>
+              <a:t>are</a:t>
             </a:r>
             <a:r>
               <a:rPr lang="fi-FI" sz="2800" dirty="0" smtClean="0"/>
@@ -6149,147 +6057,17 @@
             </a:r>
             <a:r>
               <a:rPr lang="fi-FI" sz="2800" dirty="0" err="1" smtClean="0"/>
-              <a:t>after</a:t>
+              <a:t>full</a:t>
             </a:r>
             <a:r>
               <a:rPr lang="fi-FI" sz="2800" dirty="0" smtClean="0"/>
-              <a:t> the </a:t>
+              <a:t> of </a:t>
             </a:r>
             <a:r>
               <a:rPr lang="fi-FI" sz="2800" dirty="0" err="1" smtClean="0"/>
-              <a:t>project</a:t>
-            </a:r>
-            <a:endParaRPr lang="fi-FI" sz="2800" dirty="0" smtClean="0"/>
-          </a:p>
-          <a:p>
-            <a:pPr lvl="1"/>
-            <a:r>
-              <a:rPr lang="fi-FI" sz="2400" dirty="0" smtClean="0"/>
-              <a:t>User </a:t>
-            </a:r>
-            <a:r>
-              <a:rPr lang="fi-FI" sz="2400" dirty="0" err="1" smtClean="0"/>
-              <a:t>study</a:t>
-            </a:r>
-            <a:r>
-              <a:rPr lang="fi-FI" sz="2400" dirty="0" smtClean="0"/>
-              <a:t> to </a:t>
-            </a:r>
-            <a:r>
-              <a:rPr lang="fi-FI" sz="2400" dirty="0" err="1" smtClean="0"/>
-              <a:t>make</a:t>
-            </a:r>
-            <a:r>
-              <a:rPr lang="fi-FI" sz="2400" dirty="0" smtClean="0"/>
-              <a:t> sure the </a:t>
-            </a:r>
-            <a:r>
-              <a:rPr lang="fi-FI" sz="2400" dirty="0" err="1" smtClean="0"/>
-              <a:t>usability</a:t>
-            </a:r>
-            <a:r>
-              <a:rPr lang="fi-FI" sz="2400" dirty="0" smtClean="0"/>
-              <a:t> of the </a:t>
-            </a:r>
-            <a:r>
-              <a:rPr lang="fi-FI" sz="2400" dirty="0" err="1" smtClean="0"/>
-              <a:t>tool</a:t>
-            </a:r>
-            <a:r>
-              <a:rPr lang="fi-FI" sz="2400" dirty="0" smtClean="0"/>
-              <a:t> is </a:t>
-            </a:r>
-            <a:r>
-              <a:rPr lang="fi-FI" sz="2400" dirty="0" err="1" smtClean="0"/>
-              <a:t>good</a:t>
-            </a:r>
-            <a:endParaRPr lang="fi-FI" sz="2400" dirty="0" smtClean="0"/>
-          </a:p>
-          <a:p>
-            <a:pPr lvl="1"/>
-            <a:r>
-              <a:rPr lang="fi-FI" sz="2400" dirty="0" err="1" smtClean="0"/>
-              <a:t>Several</a:t>
-            </a:r>
-            <a:r>
-              <a:rPr lang="fi-FI" sz="2400" dirty="0" smtClean="0"/>
-              <a:t> </a:t>
-            </a:r>
-            <a:r>
-              <a:rPr lang="fi-FI" sz="2400" dirty="0" err="1" smtClean="0"/>
-              <a:t>potential</a:t>
-            </a:r>
-            <a:r>
-              <a:rPr lang="fi-FI" sz="2400" dirty="0" smtClean="0"/>
-              <a:t> </a:t>
-            </a:r>
-            <a:r>
-              <a:rPr lang="fi-FI" sz="2400" dirty="0" err="1" smtClean="0"/>
-              <a:t>improvements</a:t>
-            </a:r>
-            <a:r>
-              <a:rPr lang="fi-FI" sz="2400" dirty="0" smtClean="0"/>
-              <a:t> </a:t>
-            </a:r>
-            <a:r>
-              <a:rPr lang="fi-FI" sz="2400" dirty="0" err="1" smtClean="0"/>
-              <a:t>were</a:t>
-            </a:r>
-            <a:r>
-              <a:rPr lang="fi-FI" sz="2400" dirty="0" smtClean="0"/>
-              <a:t> </a:t>
-            </a:r>
-            <a:r>
-              <a:rPr lang="fi-FI" sz="2400" dirty="0" err="1" smtClean="0"/>
-              <a:t>invented</a:t>
-            </a:r>
-            <a:r>
-              <a:rPr lang="fi-FI" sz="2400" dirty="0" smtClean="0"/>
-              <a:t> </a:t>
-            </a:r>
-            <a:r>
-              <a:rPr lang="fi-FI" sz="2400" dirty="0" smtClean="0">
-                <a:sym typeface="Wingdings" pitchFamily="2" charset="2"/>
-              </a:rPr>
-              <a:t> </a:t>
-            </a:r>
-            <a:r>
-              <a:rPr lang="fi-FI" sz="2400" dirty="0" err="1" smtClean="0">
-                <a:sym typeface="Wingdings" pitchFamily="2" charset="2"/>
-              </a:rPr>
-              <a:t>review</a:t>
-            </a:r>
-            <a:r>
-              <a:rPr lang="fi-FI" sz="2400" dirty="0" smtClean="0">
-                <a:sym typeface="Wingdings" pitchFamily="2" charset="2"/>
-              </a:rPr>
-              <a:t> and </a:t>
-            </a:r>
-            <a:r>
-              <a:rPr lang="fi-FI" sz="2400" dirty="0" err="1" smtClean="0">
-                <a:sym typeface="Wingdings" pitchFamily="2" charset="2"/>
-              </a:rPr>
-              <a:t>implementation</a:t>
-            </a:r>
-            <a:r>
-              <a:rPr lang="fi-FI" sz="2400" dirty="0" smtClean="0">
-                <a:sym typeface="Wingdings" pitchFamily="2" charset="2"/>
-              </a:rPr>
-              <a:t> to the </a:t>
-            </a:r>
-            <a:r>
-              <a:rPr lang="fi-FI" sz="2400" dirty="0" err="1" smtClean="0">
-                <a:sym typeface="Wingdings" pitchFamily="2" charset="2"/>
-              </a:rPr>
-              <a:t>next</a:t>
-            </a:r>
-            <a:r>
-              <a:rPr lang="fi-FI" sz="2400" dirty="0" smtClean="0">
-                <a:sym typeface="Wingdings" pitchFamily="2" charset="2"/>
-              </a:rPr>
-              <a:t> version</a:t>
-            </a:r>
-            <a:endParaRPr lang="en-US" sz="2400" dirty="0"/>
+              <a:t>problems</a:t>
+            </a:r>
+            <a:endParaRPr lang="en-US" sz="2800" dirty="0" smtClean="0"/>
           </a:p>
         </p:txBody>
       </p:sp>
@@ -6320,7 +6098,7 @@
     </p:spTree>
     <p:extLst>
       <p:ext uri="{BB962C8B-B14F-4D97-AF65-F5344CB8AC3E}">
-        <p14:creationId xmlns:p14="http://schemas.microsoft.com/office/powerpoint/2010/main" val="3556425416"/>
+        <p14:creationId xmlns:p14="http://schemas.microsoft.com/office/powerpoint/2010/main" val="1850462584"/>
       </p:ext>
     </p:extLst>
   </p:cSld>
@@ -6373,8 +6151,8 @@
           <a:lstStyle/>
           <a:p>
             <a:r>
-              <a:rPr lang="fi-FI" dirty="0" smtClean="0"/>
-              <a:t>Demo</a:t>
+              <a:rPr lang="fi-FI" dirty="0" err="1" smtClean="0"/>
+              <a:t>Conclusion</a:t>
             </a:r>
             <a:endParaRPr lang="en-US" dirty="0"/>
           </a:p>
@@ -6397,6 +6175,299 @@
           </a:bodyPr>
           <a:lstStyle/>
           <a:p>
+            <a:r>
+              <a:rPr lang="fi-FI" sz="2800" dirty="0" smtClean="0"/>
+              <a:t>The </a:t>
+            </a:r>
+            <a:r>
+              <a:rPr lang="fi-FI" sz="2800" dirty="0" err="1" smtClean="0"/>
+              <a:t>project</a:t>
+            </a:r>
+            <a:r>
+              <a:rPr lang="fi-FI" sz="2800" dirty="0" smtClean="0"/>
+              <a:t> </a:t>
+            </a:r>
+            <a:r>
+              <a:rPr lang="fi-FI" sz="2800" dirty="0" err="1" smtClean="0"/>
+              <a:t>was</a:t>
+            </a:r>
+            <a:r>
+              <a:rPr lang="fi-FI" sz="2800" dirty="0" smtClean="0"/>
+              <a:t> </a:t>
+            </a:r>
+            <a:r>
+              <a:rPr lang="fi-FI" sz="2800" dirty="0" err="1" smtClean="0"/>
+              <a:t>successful</a:t>
+            </a:r>
+            <a:endParaRPr lang="fi-FI" sz="2800" dirty="0" smtClean="0"/>
+          </a:p>
+          <a:p>
+            <a:pPr lvl="1"/>
+            <a:r>
+              <a:rPr lang="fi-FI" sz="2400" dirty="0" smtClean="0"/>
+              <a:t>The </a:t>
+            </a:r>
+            <a:r>
+              <a:rPr lang="fi-FI" sz="2400" dirty="0" err="1" smtClean="0"/>
+              <a:t>first</a:t>
+            </a:r>
+            <a:r>
+              <a:rPr lang="fi-FI" sz="2400" dirty="0" smtClean="0"/>
+              <a:t> </a:t>
+            </a:r>
+            <a:r>
+              <a:rPr lang="fi-FI" sz="2400" dirty="0" err="1" smtClean="0"/>
+              <a:t>fully</a:t>
+            </a:r>
+            <a:r>
+              <a:rPr lang="fi-FI" sz="2400" dirty="0" smtClean="0"/>
+              <a:t> </a:t>
+            </a:r>
+            <a:r>
+              <a:rPr lang="fi-FI" sz="2400" dirty="0" err="1" smtClean="0"/>
+              <a:t>functional</a:t>
+            </a:r>
+            <a:r>
+              <a:rPr lang="fi-FI" sz="2400" dirty="0" smtClean="0"/>
+              <a:t> version of the </a:t>
+            </a:r>
+            <a:r>
+              <a:rPr lang="fi-FI" sz="2400" dirty="0" err="1" smtClean="0"/>
+              <a:t>tool</a:t>
+            </a:r>
+            <a:r>
+              <a:rPr lang="fi-FI" sz="2400" dirty="0" smtClean="0"/>
+              <a:t> </a:t>
+            </a:r>
+            <a:r>
+              <a:rPr lang="fi-FI" sz="2400" dirty="0" err="1" smtClean="0"/>
+              <a:t>was</a:t>
+            </a:r>
+            <a:r>
+              <a:rPr lang="fi-FI" sz="2400" dirty="0" smtClean="0"/>
+              <a:t> </a:t>
+            </a:r>
+            <a:r>
+              <a:rPr lang="fi-FI" sz="2400" dirty="0" err="1" smtClean="0"/>
+              <a:t>finished</a:t>
+            </a:r>
+            <a:endParaRPr lang="fi-FI" sz="2400" dirty="0" smtClean="0"/>
+          </a:p>
+          <a:p>
+            <a:pPr lvl="1"/>
+            <a:r>
+              <a:rPr lang="fi-FI" sz="2400" dirty="0" err="1" smtClean="0"/>
+              <a:t>All</a:t>
+            </a:r>
+            <a:r>
+              <a:rPr lang="fi-FI" sz="2400" dirty="0" smtClean="0"/>
+              <a:t> </a:t>
+            </a:r>
+            <a:r>
+              <a:rPr lang="fi-FI" sz="2400" dirty="0" err="1" smtClean="0"/>
+              <a:t>members</a:t>
+            </a:r>
+            <a:r>
+              <a:rPr lang="fi-FI" sz="2400" dirty="0" smtClean="0"/>
+              <a:t> </a:t>
+            </a:r>
+            <a:r>
+              <a:rPr lang="fi-FI" sz="2400" dirty="0" err="1" smtClean="0"/>
+              <a:t>are</a:t>
+            </a:r>
+            <a:r>
+              <a:rPr lang="fi-FI" sz="2400" dirty="0" smtClean="0"/>
+              <a:t> </a:t>
+            </a:r>
+            <a:r>
+              <a:rPr lang="fi-FI" sz="2400" dirty="0" err="1" smtClean="0"/>
+              <a:t>now</a:t>
+            </a:r>
+            <a:r>
+              <a:rPr lang="fi-FI" sz="2400" dirty="0" smtClean="0"/>
+              <a:t> </a:t>
+            </a:r>
+            <a:r>
+              <a:rPr lang="fi-FI" sz="2400" dirty="0" err="1" smtClean="0"/>
+              <a:t>familiar</a:t>
+            </a:r>
+            <a:r>
+              <a:rPr lang="fi-FI" sz="2400" dirty="0" smtClean="0"/>
+              <a:t> with </a:t>
+            </a:r>
+            <a:r>
+              <a:rPr lang="fi-FI" sz="2400" dirty="0" err="1" smtClean="0"/>
+              <a:t>Qt</a:t>
+            </a:r>
+            <a:r>
+              <a:rPr lang="fi-FI" sz="2400" dirty="0" smtClean="0"/>
+              <a:t> </a:t>
+            </a:r>
+            <a:r>
+              <a:rPr lang="fi-FI" sz="2400" dirty="0" err="1" smtClean="0"/>
+              <a:t>development</a:t>
+            </a:r>
+            <a:endParaRPr lang="fi-FI" sz="2400" dirty="0"/>
+          </a:p>
+          <a:p>
+            <a:r>
+              <a:rPr lang="fi-FI" sz="2800" dirty="0" err="1" smtClean="0"/>
+              <a:t>Next</a:t>
+            </a:r>
+            <a:r>
+              <a:rPr lang="fi-FI" sz="2800" dirty="0" smtClean="0"/>
+              <a:t> </a:t>
+            </a:r>
+            <a:r>
+              <a:rPr lang="fi-FI" sz="2800" dirty="0" err="1" smtClean="0"/>
+              <a:t>steps</a:t>
+            </a:r>
+            <a:r>
+              <a:rPr lang="fi-FI" sz="2800" dirty="0" smtClean="0"/>
+              <a:t> </a:t>
+            </a:r>
+            <a:r>
+              <a:rPr lang="fi-FI" sz="2800" dirty="0" err="1" smtClean="0"/>
+              <a:t>after</a:t>
+            </a:r>
+            <a:r>
+              <a:rPr lang="fi-FI" sz="2800" dirty="0" smtClean="0"/>
+              <a:t> the </a:t>
+            </a:r>
+            <a:r>
+              <a:rPr lang="fi-FI" sz="2800" dirty="0" err="1" smtClean="0"/>
+              <a:t>project</a:t>
+            </a:r>
+            <a:endParaRPr lang="fi-FI" sz="2800" dirty="0" smtClean="0"/>
+          </a:p>
+          <a:p>
+            <a:pPr lvl="1"/>
+            <a:r>
+              <a:rPr lang="fi-FI" sz="2400" dirty="0" smtClean="0"/>
+              <a:t>User </a:t>
+            </a:r>
+            <a:r>
+              <a:rPr lang="fi-FI" sz="2400" dirty="0" err="1" smtClean="0"/>
+              <a:t>study</a:t>
+            </a:r>
+            <a:r>
+              <a:rPr lang="fi-FI" sz="2400" dirty="0" smtClean="0"/>
+              <a:t> to </a:t>
+            </a:r>
+            <a:r>
+              <a:rPr lang="fi-FI" sz="2400" dirty="0" err="1" smtClean="0"/>
+              <a:t>make</a:t>
+            </a:r>
+            <a:r>
+              <a:rPr lang="fi-FI" sz="2400" dirty="0" smtClean="0"/>
+              <a:t> sure the </a:t>
+            </a:r>
+            <a:r>
+              <a:rPr lang="fi-FI" sz="2400" dirty="0" err="1" smtClean="0"/>
+              <a:t>usability</a:t>
+            </a:r>
+            <a:r>
+              <a:rPr lang="fi-FI" sz="2400" dirty="0" smtClean="0"/>
+              <a:t> of the </a:t>
+            </a:r>
+            <a:r>
+              <a:rPr lang="fi-FI" sz="2400" dirty="0" err="1" smtClean="0"/>
+              <a:t>tool</a:t>
+            </a:r>
+            <a:r>
+              <a:rPr lang="fi-FI" sz="2400" dirty="0" smtClean="0"/>
+              <a:t> is </a:t>
+            </a:r>
+            <a:r>
+              <a:rPr lang="fi-FI" sz="2400" dirty="0" err="1" smtClean="0"/>
+              <a:t>good</a:t>
+            </a:r>
+            <a:endParaRPr lang="fi-FI" sz="2400" dirty="0" smtClean="0"/>
+          </a:p>
+          <a:p>
+            <a:pPr lvl="1"/>
+            <a:r>
+              <a:rPr lang="fi-FI" sz="2400" dirty="0" err="1" smtClean="0"/>
+              <a:t>Several</a:t>
+            </a:r>
+            <a:r>
+              <a:rPr lang="fi-FI" sz="2400" dirty="0" smtClean="0"/>
+              <a:t> </a:t>
+            </a:r>
+            <a:r>
+              <a:rPr lang="fi-FI" sz="2400" dirty="0" err="1" smtClean="0"/>
+              <a:t>potential</a:t>
+            </a:r>
+            <a:r>
+              <a:rPr lang="fi-FI" sz="2400" dirty="0" smtClean="0"/>
+              <a:t> </a:t>
+            </a:r>
+            <a:r>
+              <a:rPr lang="fi-FI" sz="2400" dirty="0" err="1" smtClean="0"/>
+              <a:t>improvements</a:t>
+            </a:r>
+            <a:r>
+              <a:rPr lang="fi-FI" sz="2400" dirty="0" smtClean="0"/>
+              <a:t> </a:t>
+            </a:r>
+            <a:r>
+              <a:rPr lang="fi-FI" sz="2400" dirty="0" err="1" smtClean="0"/>
+              <a:t>were</a:t>
+            </a:r>
+            <a:r>
+              <a:rPr lang="fi-FI" sz="2400" dirty="0" smtClean="0"/>
+              <a:t> </a:t>
+            </a:r>
+            <a:r>
+              <a:rPr lang="fi-FI" sz="2400" dirty="0" err="1" smtClean="0"/>
+              <a:t>invented</a:t>
+            </a:r>
+            <a:r>
+              <a:rPr lang="fi-FI" sz="2400" dirty="0" smtClean="0"/>
+              <a:t> </a:t>
+            </a:r>
+            <a:r>
+              <a:rPr lang="fi-FI" sz="2400" dirty="0" smtClean="0">
+                <a:sym typeface="Wingdings" pitchFamily="2" charset="2"/>
+              </a:rPr>
+              <a:t> </a:t>
+            </a:r>
+            <a:r>
+              <a:rPr lang="fi-FI" sz="2400" dirty="0" err="1" smtClean="0">
+                <a:sym typeface="Wingdings" pitchFamily="2" charset="2"/>
+              </a:rPr>
+              <a:t>review</a:t>
+            </a:r>
+            <a:r>
+              <a:rPr lang="fi-FI" sz="2400" dirty="0" smtClean="0">
+                <a:sym typeface="Wingdings" pitchFamily="2" charset="2"/>
+              </a:rPr>
+              <a:t> and </a:t>
+            </a:r>
+            <a:r>
+              <a:rPr lang="fi-FI" sz="2400" dirty="0" err="1" smtClean="0">
+                <a:sym typeface="Wingdings" pitchFamily="2" charset="2"/>
+              </a:rPr>
+              <a:t>implementation</a:t>
+            </a:r>
+            <a:r>
+              <a:rPr lang="fi-FI" sz="2400" dirty="0" smtClean="0">
+                <a:sym typeface="Wingdings" pitchFamily="2" charset="2"/>
+              </a:rPr>
+              <a:t> to the </a:t>
+            </a:r>
+            <a:r>
+              <a:rPr lang="fi-FI" sz="2400" dirty="0" err="1" smtClean="0">
+                <a:sym typeface="Wingdings" pitchFamily="2" charset="2"/>
+              </a:rPr>
+              <a:t>next</a:t>
+            </a:r>
+            <a:r>
+              <a:rPr lang="fi-FI" sz="2400" dirty="0" smtClean="0">
+                <a:sym typeface="Wingdings" pitchFamily="2" charset="2"/>
+              </a:rPr>
+              <a:t> version</a:t>
+            </a:r>
             <a:endParaRPr lang="en-US" sz="2400" dirty="0"/>
           </a:p>
         </p:txBody>
@@ -6428,7 +6499,7 @@
     </p:spTree>
     <p:extLst>
       <p:ext uri="{BB962C8B-B14F-4D97-AF65-F5344CB8AC3E}">
-        <p14:creationId xmlns:p14="http://schemas.microsoft.com/office/powerpoint/2010/main" val="2083738198"/>
+        <p14:creationId xmlns:p14="http://schemas.microsoft.com/office/powerpoint/2010/main" val="3556425416"/>
       </p:ext>
     </p:extLst>
   </p:cSld>
@@ -6467,6 +6538,114 @@
       </p:grpSpPr>
       <p:sp>
         <p:nvSpPr>
+          <p:cNvPr id="5" name="Title 4"/>
+          <p:cNvSpPr>
+            <a:spLocks noGrp="1"/>
+          </p:cNvSpPr>
+          <p:nvPr>
+            <p:ph type="title"/>
+          </p:nvPr>
+        </p:nvSpPr>
+        <p:spPr/>
+        <p:txBody>
+          <a:bodyPr/>
+          <a:lstStyle/>
+          <a:p>
+            <a:r>
+              <a:rPr lang="fi-FI" dirty="0" smtClean="0"/>
+              <a:t>Demo</a:t>
+            </a:r>
+            <a:endParaRPr lang="en-US" dirty="0"/>
+          </a:p>
+        </p:txBody>
+      </p:sp>
+      <p:sp>
+        <p:nvSpPr>
+          <p:cNvPr id="6" name="Content Placeholder 5"/>
+          <p:cNvSpPr>
+            <a:spLocks noGrp="1"/>
+          </p:cNvSpPr>
+          <p:nvPr>
+            <p:ph idx="1"/>
+          </p:nvPr>
+        </p:nvSpPr>
+        <p:spPr/>
+        <p:txBody>
+          <a:bodyPr>
+            <a:noAutofit/>
+          </a:bodyPr>
+          <a:lstStyle/>
+          <a:p>
+            <a:endParaRPr lang="en-US" sz="2400" dirty="0"/>
+          </a:p>
+        </p:txBody>
+      </p:sp>
+      <p:sp>
+        <p:nvSpPr>
+          <p:cNvPr id="4" name="Slide Number Placeholder 3"/>
+          <p:cNvSpPr>
+            <a:spLocks noGrp="1"/>
+          </p:cNvSpPr>
+          <p:nvPr>
+            <p:ph type="sldNum" sz="quarter" idx="11"/>
+          </p:nvPr>
+        </p:nvSpPr>
+        <p:spPr/>
+        <p:txBody>
+          <a:bodyPr/>
+          <a:lstStyle/>
+          <a:p>
+            <a:fld id="{396A2528-BFCE-4DA1-8CA6-E7CCE78C7A79}" type="slidenum">
+              <a:rPr lang="fi-FI" smtClean="0"/>
+              <a:pPr/>
+              <a:t>15</a:t>
+            </a:fld>
+            <a:endParaRPr lang="fi-FI" dirty="0"/>
+          </a:p>
+        </p:txBody>
+      </p:sp>
+    </p:spTree>
+    <p:extLst>
+      <p:ext uri="{BB962C8B-B14F-4D97-AF65-F5344CB8AC3E}">
+        <p14:creationId xmlns:p14="http://schemas.microsoft.com/office/powerpoint/2010/main" val="2083738198"/>
+      </p:ext>
+    </p:extLst>
+  </p:cSld>
+  <p:clrMapOvr>
+    <a:masterClrMapping/>
+  </p:clrMapOvr>
+  <p:transition>
+    <p:zoom/>
+  </p:transition>
+  <p:timing>
+    <p:tnLst>
+      <p:par>
+        <p:cTn id="1" dur="indefinite" restart="never" nodeType="tmRoot"/>
+      </p:par>
+    </p:tnLst>
+  </p:timing>
+</p:sld>
+</file>
+
+<file path=ppt/slides/slide16.xml><?xml version="1.0" encoding="utf-8"?>
+<p:sld xmlns:a="http://schemas.openxmlformats.org/drawingml/2006/main" xmlns:r="http://schemas.openxmlformats.org/officeDocument/2006/relationships" xmlns:p="http://schemas.openxmlformats.org/presentationml/2006/main">
+  <p:cSld>
+    <p:spTree>
+      <p:nvGrpSpPr>
+        <p:cNvPr id="1" name=""/>
+        <p:cNvGrpSpPr/>
+        <p:nvPr/>
+      </p:nvGrpSpPr>
+      <p:grpSpPr>
+        <a:xfrm>
+          <a:off x="0" y="0"/>
+          <a:ext cx="0" cy="0"/>
+          <a:chOff x="0" y="0"/>
+          <a:chExt cx="0" cy="0"/>
+        </a:xfrm>
+      </p:grpSpPr>
+      <p:sp>
+        <p:nvSpPr>
           <p:cNvPr id="2" name="Title 1"/>
           <p:cNvSpPr>
             <a:spLocks noGrp="1"/>
@@ -6529,7 +6708,7 @@
             <a:fld id="{396A2528-BFCE-4DA1-8CA6-E7CCE78C7A79}" type="slidenum">
               <a:rPr lang="fi-FI" smtClean="0"/>
               <a:pPr/>
-              <a:t>15</a:t>
+              <a:t>16</a:t>
             </a:fld>
             <a:endParaRPr lang="fi-FI" dirty="0"/>
           </a:p>
@@ -7074,13 +7253,283 @@
       </p:grpSpPr>
       <p:sp>
         <p:nvSpPr>
+          <p:cNvPr id="5" name="Title 4"/>
+          <p:cNvSpPr>
+            <a:spLocks noGrp="1"/>
+          </p:cNvSpPr>
+          <p:nvPr>
+            <p:ph type="title"/>
+          </p:nvPr>
+        </p:nvSpPr>
+        <p:spPr/>
+        <p:txBody>
+          <a:bodyPr/>
+          <a:lstStyle/>
+          <a:p>
+            <a:r>
+              <a:rPr lang="fi-FI" dirty="0" smtClean="0"/>
+              <a:t>Project </a:t>
+            </a:r>
+            <a:r>
+              <a:rPr lang="fi-FI" dirty="0" err="1" smtClean="0"/>
+              <a:t>Background</a:t>
+            </a:r>
+            <a:r>
+              <a:rPr lang="fi-FI" dirty="0" smtClean="0"/>
+              <a:t> (1)</a:t>
+            </a:r>
+            <a:endParaRPr lang="en-US" dirty="0"/>
+          </a:p>
+        </p:txBody>
+      </p:sp>
+      <p:sp>
+        <p:nvSpPr>
+          <p:cNvPr id="6" name="Content Placeholder 5"/>
+          <p:cNvSpPr>
+            <a:spLocks noGrp="1"/>
+          </p:cNvSpPr>
+          <p:nvPr>
+            <p:ph idx="1"/>
+          </p:nvPr>
+        </p:nvSpPr>
+        <p:spPr>
+          <a:xfrm>
+            <a:off x="827584" y="1196975"/>
+            <a:ext cx="7814766" cy="5127625"/>
+          </a:xfrm>
+        </p:spPr>
+        <p:txBody>
+          <a:bodyPr>
+            <a:normAutofit/>
+          </a:bodyPr>
+          <a:lstStyle/>
+          <a:p>
+            <a:r>
+              <a:rPr lang="en-US" sz="2800" dirty="0" smtClean="0"/>
+              <a:t>Kactus2</a:t>
+            </a:r>
+            <a:endParaRPr lang="en-US" sz="2800" dirty="0"/>
+          </a:p>
+          <a:p>
+            <a:pPr lvl="1"/>
+            <a:r>
+              <a:rPr lang="en-US" sz="2400" dirty="0"/>
+              <a:t>Developed at TUT</a:t>
+            </a:r>
+          </a:p>
+          <a:p>
+            <a:pPr lvl="1"/>
+            <a:r>
+              <a:rPr lang="en-US" sz="2400" dirty="0"/>
+              <a:t>Open-source toolset to design embedded products, especially FPGA-based MP-</a:t>
+            </a:r>
+            <a:r>
+              <a:rPr lang="en-US" sz="2400" dirty="0" err="1"/>
+              <a:t>SoCs</a:t>
+            </a:r>
+            <a:endParaRPr lang="en-US" sz="2400" dirty="0"/>
+          </a:p>
+          <a:p>
+            <a:pPr lvl="1"/>
+            <a:r>
+              <a:rPr lang="en-US" sz="2400" dirty="0"/>
+              <a:t>Based on IP-XACT XML metadata and design </a:t>
+            </a:r>
+            <a:r>
+              <a:rPr lang="en-US" sz="2400" dirty="0" smtClean="0"/>
+              <a:t>methodology</a:t>
+            </a:r>
+          </a:p>
+          <a:p>
+            <a:r>
+              <a:rPr lang="en-US" sz="2800" dirty="0"/>
+              <a:t>Kactus2 goals</a:t>
+            </a:r>
+          </a:p>
+          <a:p>
+            <a:pPr lvl="1"/>
+            <a:r>
+              <a:rPr lang="en-US" sz="2400" dirty="0"/>
+              <a:t>Easier IP reusability</a:t>
+            </a:r>
+          </a:p>
+          <a:p>
+            <a:pPr lvl="1"/>
+            <a:r>
+              <a:rPr lang="en-US" sz="2400" dirty="0"/>
+              <a:t>Practical HW/SW </a:t>
+            </a:r>
+            <a:r>
+              <a:rPr lang="en-US" sz="2400" dirty="0" smtClean="0"/>
+              <a:t>abstraction for</a:t>
+            </a:r>
+            <a:br>
+              <a:rPr lang="en-US" sz="2400" dirty="0" smtClean="0"/>
+            </a:br>
+            <a:r>
+              <a:rPr lang="en-US" sz="2400" dirty="0" smtClean="0"/>
+              <a:t>easier </a:t>
+            </a:r>
+            <a:r>
+              <a:rPr lang="en-US" sz="2400" dirty="0"/>
+              <a:t>application </a:t>
+            </a:r>
+            <a:r>
+              <a:rPr lang="en-US" sz="2400" dirty="0" smtClean="0"/>
+              <a:t>SW development</a:t>
+            </a:r>
+            <a:endParaRPr lang="en-US" sz="2400" dirty="0"/>
+          </a:p>
+          <a:p>
+            <a:pPr lvl="1"/>
+            <a:r>
+              <a:rPr lang="en-US" sz="2400" dirty="0"/>
+              <a:t>The most user-friendly EDA tool</a:t>
+            </a:r>
+          </a:p>
+          <a:p>
+            <a:pPr lvl="1"/>
+            <a:endParaRPr lang="en-US" sz="2400" dirty="0"/>
+          </a:p>
+        </p:txBody>
+      </p:sp>
+      <p:sp>
+        <p:nvSpPr>
+          <p:cNvPr id="4" name="Slide Number Placeholder 3"/>
+          <p:cNvSpPr>
+            <a:spLocks noGrp="1"/>
+          </p:cNvSpPr>
+          <p:nvPr>
+            <p:ph type="sldNum" sz="quarter" idx="11"/>
+          </p:nvPr>
+        </p:nvSpPr>
+        <p:spPr/>
+        <p:txBody>
+          <a:bodyPr/>
+          <a:lstStyle/>
+          <a:p>
+            <a:fld id="{396A2528-BFCE-4DA1-8CA6-E7CCE78C7A79}" type="slidenum">
+              <a:rPr lang="fi-FI" smtClean="0"/>
+              <a:pPr/>
+              <a:t>4</a:t>
+            </a:fld>
+            <a:endParaRPr lang="fi-FI" dirty="0"/>
+          </a:p>
+        </p:txBody>
+      </p:sp>
+      <p:pic>
+        <p:nvPicPr>
+          <p:cNvPr id="1026" name="Picture 2"/>
+          <p:cNvPicPr>
+            <a:picLocks noChangeAspect="1" noChangeArrowheads="1"/>
+          </p:cNvPicPr>
+          <p:nvPr/>
+        </p:nvPicPr>
+        <p:blipFill>
+          <a:blip r:embed="rId2">
+            <a:extLst>
+              <a:ext uri="{28A0092B-C50C-407E-A947-70E740481C1C}">
+                <a14:useLocalDpi xmlns:a14="http://schemas.microsoft.com/office/drawing/2010/main" val="0"/>
+              </a:ext>
+            </a:extLst>
+          </a:blip>
+          <a:srcRect/>
+          <a:stretch>
+            <a:fillRect/>
+          </a:stretch>
+        </p:blipFill>
+        <p:spPr bwMode="auto">
+          <a:xfrm>
+            <a:off x="6156175" y="4136616"/>
+            <a:ext cx="2683981" cy="2028688"/>
+          </a:xfrm>
+          <a:prstGeom prst="rect">
+            <a:avLst/>
+          </a:prstGeom>
+          <a:noFill/>
+          <a:ln>
+            <a:noFill/>
+          </a:ln>
+          <a:effectLst/>
+          <a:extLst>
+            <a:ext uri="{909E8E84-426E-40DD-AFC4-6F175D3DCCD1}">
+              <a14:hiddenFill xmlns:a14="http://schemas.microsoft.com/office/drawing/2010/main">
+                <a:solidFill>
+                  <a:schemeClr val="accent1"/>
+                </a:solidFill>
+              </a14:hiddenFill>
+            </a:ext>
+            <a:ext uri="{91240B29-F687-4F45-9708-019B960494DF}">
+              <a14:hiddenLine xmlns:a14="http://schemas.microsoft.com/office/drawing/2010/main" w="9525">
+                <a:solidFill>
+                  <a:schemeClr val="tx1"/>
+                </a:solidFill>
+                <a:miter lim="800000"/>
+                <a:headEnd/>
+                <a:tailEnd/>
+              </a14:hiddenLine>
+            </a:ext>
+            <a:ext uri="{AF507438-7753-43E0-B8FC-AC1667EBCBE1}">
+              <a14:hiddenEffects xmlns:a14="http://schemas.microsoft.com/office/drawing/2010/main">
+                <a:effectLst>
+                  <a:outerShdw dist="35921" dir="2700000" algn="ctr" rotWithShape="0">
+                    <a:schemeClr val="bg2"/>
+                  </a:outerShdw>
+                </a:effectLst>
+              </a14:hiddenEffects>
+            </a:ext>
+          </a:extLst>
+        </p:spPr>
+      </p:pic>
+    </p:spTree>
+    <p:extLst>
+      <p:ext uri="{BB962C8B-B14F-4D97-AF65-F5344CB8AC3E}">
+        <p14:creationId xmlns:p14="http://schemas.microsoft.com/office/powerpoint/2010/main" val="3384251811"/>
+      </p:ext>
+    </p:extLst>
+  </p:cSld>
+  <p:clrMapOvr>
+    <a:masterClrMapping/>
+  </p:clrMapOvr>
+  <p:transition>
+    <p:zoom/>
+  </p:transition>
+  <p:timing>
+    <p:tnLst>
+      <p:par>
+        <p:cTn id="1" dur="indefinite" restart="never" nodeType="tmRoot"/>
+      </p:par>
+    </p:tnLst>
+  </p:timing>
+</p:sld>
+</file>
+
+<file path=ppt/slides/slide5.xml><?xml version="1.0" encoding="utf-8"?>
+<p:sld xmlns:a="http://schemas.openxmlformats.org/drawingml/2006/main" xmlns:r="http://schemas.openxmlformats.org/officeDocument/2006/relationships" xmlns:p="http://schemas.openxmlformats.org/presentationml/2006/main">
+  <p:cSld>
+    <p:spTree>
+      <p:nvGrpSpPr>
+        <p:cNvPr id="1" name=""/>
+        <p:cNvGrpSpPr/>
+        <p:nvPr/>
+      </p:nvGrpSpPr>
+      <p:grpSpPr>
+        <a:xfrm>
+          <a:off x="0" y="0"/>
+          <a:ext cx="0" cy="0"/>
+          <a:chOff x="0" y="0"/>
+          <a:chExt cx="0" cy="0"/>
+        </a:xfrm>
+      </p:grpSpPr>
+      <p:sp>
+        <p:nvSpPr>
           <p:cNvPr id="16" name="Rectangle 15"/>
           <p:cNvSpPr/>
           <p:nvPr/>
         </p:nvSpPr>
         <p:spPr bwMode="auto">
           <a:xfrm>
-            <a:off x="6475512" y="3477340"/>
+            <a:off x="6475512" y="4929084"/>
             <a:ext cx="1224136" cy="275621"/>
           </a:xfrm>
           <a:prstGeom prst="rect">
@@ -7162,7 +7611,7 @@
         </p:nvSpPr>
         <p:spPr bwMode="auto">
           <a:xfrm>
-            <a:off x="6475512" y="3764850"/>
+            <a:off x="6475512" y="5216594"/>
             <a:ext cx="1224136" cy="275621"/>
           </a:xfrm>
           <a:prstGeom prst="rect">
@@ -7244,7 +7693,7 @@
         </p:nvSpPr>
         <p:spPr bwMode="auto">
           <a:xfrm>
-            <a:off x="6475512" y="4316092"/>
+            <a:off x="6475512" y="5767836"/>
             <a:ext cx="1224136" cy="275621"/>
           </a:xfrm>
           <a:prstGeom prst="rect">
@@ -7326,7 +7775,7 @@
         </p:nvSpPr>
         <p:spPr bwMode="auto">
           <a:xfrm>
-            <a:off x="6475512" y="4040471"/>
+            <a:off x="6475512" y="5492215"/>
             <a:ext cx="1224136" cy="275621"/>
           </a:xfrm>
           <a:prstGeom prst="rect">
@@ -7408,7 +7857,7 @@
         </p:nvSpPr>
         <p:spPr bwMode="auto">
           <a:xfrm>
-            <a:off x="6475512" y="3201719"/>
+            <a:off x="6475512" y="4653463"/>
             <a:ext cx="1224136" cy="275621"/>
           </a:xfrm>
           <a:prstGeom prst="rect">
@@ -7490,7 +7939,7 @@
         </p:nvSpPr>
         <p:spPr bwMode="auto">
           <a:xfrm>
-            <a:off x="7699979" y="3477071"/>
+            <a:off x="7699979" y="4928815"/>
             <a:ext cx="1069669" cy="275621"/>
           </a:xfrm>
           <a:prstGeom prst="rect">
@@ -7567,7 +8016,7 @@
         </p:nvSpPr>
         <p:spPr bwMode="auto">
           <a:xfrm>
-            <a:off x="7699979" y="3764581"/>
+            <a:off x="7699979" y="5216325"/>
             <a:ext cx="1069669" cy="275621"/>
           </a:xfrm>
           <a:prstGeom prst="rect">
@@ -7644,7 +8093,7 @@
         </p:nvSpPr>
         <p:spPr bwMode="auto">
           <a:xfrm>
-            <a:off x="7699979" y="4315823"/>
+            <a:off x="7699979" y="5767567"/>
             <a:ext cx="1069669" cy="275621"/>
           </a:xfrm>
           <a:prstGeom prst="rect">
@@ -7721,7 +8170,7 @@
         </p:nvSpPr>
         <p:spPr bwMode="auto">
           <a:xfrm>
-            <a:off x="7699979" y="4040202"/>
+            <a:off x="7699979" y="5491946"/>
             <a:ext cx="1069669" cy="275621"/>
           </a:xfrm>
           <a:prstGeom prst="rect">
@@ -7798,7 +8247,7 @@
         </p:nvSpPr>
         <p:spPr bwMode="auto">
           <a:xfrm>
-            <a:off x="7699979" y="3201450"/>
+            <a:off x="7699979" y="4653194"/>
             <a:ext cx="1069669" cy="275621"/>
           </a:xfrm>
           <a:prstGeom prst="rect">
@@ -7875,7 +8324,7 @@
         </p:nvSpPr>
         <p:spPr bwMode="auto">
           <a:xfrm>
-            <a:off x="732772" y="3003777"/>
+            <a:off x="732772" y="4455521"/>
             <a:ext cx="1008000" cy="1224000"/>
           </a:xfrm>
           <a:prstGeom prst="snip1Rect">
@@ -7971,7 +8420,7 @@
         </p:nvSpPr>
         <p:spPr bwMode="auto">
           <a:xfrm>
-            <a:off x="1505472" y="3632613"/>
+            <a:off x="1505472" y="5084357"/>
             <a:ext cx="1008000" cy="1224136"/>
           </a:xfrm>
           <a:prstGeom prst="snip1Rect">
@@ -8063,6 +8512,10 @@
               <a:rPr lang="fi-FI" dirty="0" err="1" smtClean="0"/>
               <a:t>Background</a:t>
             </a:r>
+            <a:r>
+              <a:rPr lang="fi-FI" dirty="0" smtClean="0"/>
+              <a:t> (2)</a:t>
+            </a:r>
             <a:endParaRPr lang="en-US" dirty="0"/>
           </a:p>
         </p:txBody>
@@ -8077,10 +8530,15 @@
             <p:ph idx="1"/>
           </p:nvPr>
         </p:nvSpPr>
-        <p:spPr/>
+        <p:spPr>
+          <a:xfrm>
+            <a:off x="1428728" y="1196975"/>
+            <a:ext cx="7319985" cy="2952105"/>
+          </a:xfrm>
+        </p:spPr>
         <p:txBody>
           <a:bodyPr>
-            <a:normAutofit/>
+            <a:normAutofit fontScale="70000" lnSpcReduction="20000"/>
           </a:bodyPr>
           <a:lstStyle/>
           <a:p>
@@ -8142,7 +8600,7 @@
             </a:r>
             <a:r>
               <a:rPr lang="fi-FI" dirty="0" err="1" smtClean="0"/>
-              <a:t>file</a:t>
+              <a:t>dependent</a:t>
             </a:r>
             <a:r>
               <a:rPr lang="fi-FI" dirty="0" smtClean="0"/>
@@ -8150,8 +8608,155 @@
             </a:r>
             <a:r>
               <a:rPr lang="fi-FI" dirty="0" err="1" smtClean="0"/>
+              <a:t>files</a:t>
+            </a:r>
+            <a:r>
+              <a:rPr lang="fi-FI" dirty="0"/>
+              <a:t> </a:t>
+            </a:r>
+            <a:r>
+              <a:rPr lang="fi-FI" dirty="0" err="1" smtClean="0"/>
+              <a:t>or</a:t>
+            </a:r>
+            <a:r>
+              <a:rPr lang="fi-FI" dirty="0" smtClean="0"/>
+              <a:t> </a:t>
+            </a:r>
+            <a:r>
+              <a:rPr lang="fi-FI" dirty="0" err="1" smtClean="0"/>
+              <a:t>libraries</a:t>
+            </a:r>
+            <a:endParaRPr lang="fi-FI" dirty="0" smtClean="0"/>
+          </a:p>
+          <a:p>
+            <a:pPr lvl="1"/>
+            <a:r>
+              <a:rPr lang="en-US" dirty="0"/>
+              <a:t>As project size increases, it becomes more and more difficult to keep track of these file </a:t>
+            </a:r>
+            <a:r>
+              <a:rPr lang="en-US" dirty="0" smtClean="0"/>
               <a:t>dependencies</a:t>
             </a:r>
+          </a:p>
+          <a:p>
+            <a:r>
+              <a:rPr lang="fi-FI" dirty="0" err="1" smtClean="0"/>
+              <a:t>Solution</a:t>
+            </a:r>
+            <a:r>
+              <a:rPr lang="fi-FI" dirty="0" smtClean="0"/>
+              <a:t>: a</a:t>
+            </a:r>
+            <a:r>
+              <a:rPr lang="en-US" dirty="0" err="1" smtClean="0"/>
+              <a:t>utomate</a:t>
+            </a:r>
+            <a:r>
+              <a:rPr lang="en-US" dirty="0" smtClean="0"/>
+              <a:t> file </a:t>
+            </a:r>
+            <a:r>
+              <a:rPr lang="en-US" dirty="0"/>
+              <a:t>dependency tracking by scanning supported files and </a:t>
+            </a:r>
+            <a:r>
+              <a:rPr lang="en-US" dirty="0" smtClean="0"/>
+              <a:t>keeping </a:t>
+            </a:r>
+            <a:r>
+              <a:rPr lang="en-US" dirty="0"/>
+              <a:t>track of file </a:t>
+            </a:r>
+            <a:r>
+              <a:rPr lang="en-US" dirty="0" smtClean="0"/>
+              <a:t>changes</a:t>
+            </a:r>
+          </a:p>
+          <a:p>
+            <a:pPr lvl="1"/>
+            <a:r>
+              <a:rPr lang="fi-FI" dirty="0" err="1" smtClean="0"/>
+              <a:t>Allow</a:t>
+            </a:r>
+            <a:r>
+              <a:rPr lang="fi-FI" dirty="0" smtClean="0"/>
+              <a:t> </a:t>
+            </a:r>
+            <a:r>
+              <a:rPr lang="fi-FI" dirty="0" err="1" smtClean="0"/>
+              <a:t>also</a:t>
+            </a:r>
+            <a:r>
+              <a:rPr lang="fi-FI" dirty="0" smtClean="0"/>
+              <a:t> </a:t>
+            </a:r>
+            <a:r>
+              <a:rPr lang="fi-FI" dirty="0" err="1" smtClean="0"/>
+              <a:t>manual</a:t>
+            </a:r>
+            <a:r>
+              <a:rPr lang="fi-FI" dirty="0" smtClean="0"/>
+              <a:t> </a:t>
+            </a:r>
+            <a:r>
+              <a:rPr lang="fi-FI" dirty="0" err="1" smtClean="0"/>
+              <a:t>dependencies</a:t>
+            </a:r>
+            <a:r>
+              <a:rPr lang="fi-FI" dirty="0" smtClean="0"/>
+              <a:t> </a:t>
+            </a:r>
+            <a:r>
+              <a:rPr lang="fi-FI" dirty="0" err="1" smtClean="0"/>
+              <a:t>between</a:t>
+            </a:r>
+            <a:r>
+              <a:rPr lang="fi-FI" dirty="0" smtClean="0"/>
+              <a:t> </a:t>
+            </a:r>
+            <a:r>
+              <a:rPr lang="fi-FI" dirty="0" err="1" smtClean="0"/>
+              <a:t>e.g</a:t>
+            </a:r>
+            <a:r>
+              <a:rPr lang="fi-FI" dirty="0" smtClean="0"/>
+              <a:t>. </a:t>
+            </a:r>
+            <a:r>
+              <a:rPr lang="fi-FI" dirty="0" err="1" smtClean="0"/>
+              <a:t>source</a:t>
+            </a:r>
+            <a:r>
+              <a:rPr lang="fi-FI" dirty="0" smtClean="0"/>
+              <a:t> </a:t>
+            </a:r>
+            <a:r>
+              <a:rPr lang="fi-FI" dirty="0" err="1" smtClean="0"/>
+              <a:t>code</a:t>
+            </a:r>
+            <a:r>
+              <a:rPr lang="fi-FI" dirty="0" smtClean="0"/>
+              <a:t> and </a:t>
+            </a:r>
+            <a:r>
+              <a:rPr lang="fi-FI" dirty="0" err="1" smtClean="0"/>
+              <a:t>documentation</a:t>
+            </a:r>
+            <a:endParaRPr lang="en-US" dirty="0"/>
+          </a:p>
+          <a:p>
+            <a:endParaRPr lang="en-US" dirty="0" smtClean="0"/>
+          </a:p>
+          <a:p>
+            <a:pPr lvl="1"/>
+            <a:endParaRPr lang="en-US" dirty="0"/>
+          </a:p>
+          <a:p>
+            <a:pPr lvl="1"/>
+            <a:endParaRPr lang="fi-FI" dirty="0" smtClean="0"/>
+          </a:p>
+          <a:p>
             <a:endParaRPr lang="fi-FI" dirty="0" smtClean="0"/>
           </a:p>
         </p:txBody>
@@ -8174,7 +8779,7 @@
             <a:fld id="{396A2528-BFCE-4DA1-8CA6-E7CCE78C7A79}" type="slidenum">
               <a:rPr lang="fi-FI" smtClean="0"/>
               <a:pPr/>
-              <a:t>4</a:t>
+              <a:t>5</a:t>
             </a:fld>
             <a:endParaRPr lang="fi-FI" dirty="0"/>
           </a:p>
@@ -8188,7 +8793,7 @@
         </p:nvSpPr>
         <p:spPr bwMode="auto">
           <a:xfrm>
-            <a:off x="1872159" y="2840525"/>
+            <a:off x="1872159" y="4292269"/>
             <a:ext cx="1008000" cy="1224000"/>
           </a:xfrm>
           <a:prstGeom prst="snip1Rect">
@@ -8284,7 +8889,7 @@
         </p:nvSpPr>
         <p:spPr bwMode="auto">
           <a:xfrm>
-            <a:off x="1289447" y="3200565"/>
+            <a:off x="1289447" y="4652309"/>
             <a:ext cx="1008000" cy="1224000"/>
           </a:xfrm>
           <a:prstGeom prst="snip1Rect">
@@ -8380,7 +8985,7 @@
         </p:nvSpPr>
         <p:spPr bwMode="auto">
           <a:xfrm>
-            <a:off x="3441056" y="2841352"/>
+            <a:off x="3441056" y="4293096"/>
             <a:ext cx="2448272" cy="2016224"/>
           </a:xfrm>
           <a:prstGeom prst="rect">
@@ -8565,7 +9170,7 @@
         </p:nvSpPr>
         <p:spPr bwMode="auto">
           <a:xfrm>
-            <a:off x="2606664" y="3632613"/>
+            <a:off x="2606664" y="5084357"/>
             <a:ext cx="978408" cy="484632"/>
           </a:xfrm>
           <a:prstGeom prst="rightArrow">
@@ -8644,7 +9249,7 @@
         </p:nvSpPr>
         <p:spPr bwMode="auto">
           <a:xfrm>
-            <a:off x="5601296" y="3632613"/>
+            <a:off x="5601296" y="5084357"/>
             <a:ext cx="978408" cy="484632"/>
           </a:xfrm>
           <a:prstGeom prst="rightArrow">
@@ -8723,7 +9328,7 @@
         </p:nvCxnSpPr>
         <p:spPr bwMode="auto">
           <a:xfrm>
-            <a:off x="7905552" y="3339260"/>
+            <a:off x="7905552" y="4791004"/>
             <a:ext cx="0" cy="593796"/>
           </a:xfrm>
           <a:prstGeom prst="straightConnector1">
@@ -8752,7 +9357,7 @@
         </p:nvCxnSpPr>
         <p:spPr bwMode="auto">
           <a:xfrm flipV="1">
-            <a:off x="8553624" y="3632613"/>
+            <a:off x="8553624" y="5084357"/>
             <a:ext cx="0" cy="563400"/>
           </a:xfrm>
           <a:prstGeom prst="straightConnector1">
@@ -8781,7 +9386,7 @@
         </p:nvCxnSpPr>
         <p:spPr bwMode="auto">
           <a:xfrm>
-            <a:off x="8113109" y="3339260"/>
+            <a:off x="8113109" y="4791004"/>
             <a:ext cx="0" cy="1125405"/>
           </a:xfrm>
           <a:prstGeom prst="straightConnector1">
@@ -8810,7 +9415,7 @@
         </p:nvCxnSpPr>
         <p:spPr bwMode="auto">
           <a:xfrm flipV="1">
-            <a:off x="8327020" y="3369657"/>
+            <a:off x="8327020" y="4821401"/>
             <a:ext cx="0" cy="826356"/>
           </a:xfrm>
           <a:prstGeom prst="straightConnector1">
@@ -8854,7 +9459,7 @@
 </p:sld>
 </file>
 
-<file path=ppt/slides/slide5.xml><?xml version="1.0" encoding="utf-8"?>
+<file path=ppt/slides/slide6.xml><?xml version="1.0" encoding="utf-8"?>
 <p:sld xmlns:a="http://schemas.openxmlformats.org/drawingml/2006/main" xmlns:r="http://schemas.openxmlformats.org/officeDocument/2006/relationships" xmlns:p="http://schemas.openxmlformats.org/presentationml/2006/main">
   <p:cSld>
     <p:spTree>
@@ -8971,7 +9576,7 @@
             <a:fld id="{396A2528-BFCE-4DA1-8CA6-E7CCE78C7A79}" type="slidenum">
               <a:rPr lang="fi-FI" smtClean="0"/>
               <a:pPr/>
-              <a:t>5</a:t>
+              <a:t>6</a:t>
             </a:fld>
             <a:endParaRPr lang="fi-FI" dirty="0"/>
           </a:p>
@@ -9000,7 +9605,7 @@
 </p:sld>
 </file>
 
-<file path=ppt/slides/slide6.xml><?xml version="1.0" encoding="utf-8"?>
+<file path=ppt/slides/slide7.xml><?xml version="1.0" encoding="utf-8"?>
 <p:sld xmlns:a="http://schemas.openxmlformats.org/drawingml/2006/main" xmlns:r="http://schemas.openxmlformats.org/officeDocument/2006/relationships" xmlns:p="http://schemas.openxmlformats.org/presentationml/2006/main">
   <p:cSld>
     <p:spTree>
@@ -9099,7 +9704,7 @@
             <a:fld id="{396A2528-BFCE-4DA1-8CA6-E7CCE78C7A79}" type="slidenum">
               <a:rPr lang="fi-FI" smtClean="0"/>
               <a:pPr/>
-              <a:t>6</a:t>
+              <a:t>7</a:t>
             </a:fld>
             <a:endParaRPr lang="fi-FI" dirty="0"/>
           </a:p>
@@ -9182,430 +9787,6 @@
 </p:sld>
 </file>
 
-<file path=ppt/slides/slide7.xml><?xml version="1.0" encoding="utf-8"?>
-<p:sld xmlns:a="http://schemas.openxmlformats.org/drawingml/2006/main" xmlns:r="http://schemas.openxmlformats.org/officeDocument/2006/relationships" xmlns:p="http://schemas.openxmlformats.org/presentationml/2006/main">
-  <p:cSld>
-    <p:spTree>
-      <p:nvGrpSpPr>
-        <p:cNvPr id="1" name=""/>
-        <p:cNvGrpSpPr/>
-        <p:nvPr/>
-      </p:nvGrpSpPr>
-      <p:grpSpPr>
-        <a:xfrm>
-          <a:off x="0" y="0"/>
-          <a:ext cx="0" cy="0"/>
-          <a:chOff x="0" y="0"/>
-          <a:chExt cx="0" cy="0"/>
-        </a:xfrm>
-      </p:grpSpPr>
-      <p:sp>
-        <p:nvSpPr>
-          <p:cNvPr id="5" name="Title 4"/>
-          <p:cNvSpPr>
-            <a:spLocks noGrp="1"/>
-          </p:cNvSpPr>
-          <p:nvPr>
-            <p:ph type="title"/>
-          </p:nvPr>
-        </p:nvSpPr>
-        <p:spPr/>
-        <p:txBody>
-          <a:bodyPr/>
-          <a:lstStyle/>
-          <a:p>
-            <a:r>
-              <a:rPr lang="fi-FI" dirty="0" err="1" smtClean="0"/>
-              <a:t>What</a:t>
-            </a:r>
-            <a:r>
-              <a:rPr lang="fi-FI" dirty="0" smtClean="0"/>
-              <a:t> </a:t>
-            </a:r>
-            <a:r>
-              <a:rPr lang="fi-FI" dirty="0" err="1" smtClean="0"/>
-              <a:t>was</a:t>
-            </a:r>
-            <a:r>
-              <a:rPr lang="fi-FI" dirty="0" smtClean="0"/>
-              <a:t> </a:t>
-            </a:r>
-            <a:r>
-              <a:rPr lang="fi-FI" dirty="0" err="1" smtClean="0"/>
-              <a:t>done</a:t>
-            </a:r>
-            <a:r>
-              <a:rPr lang="fi-FI" dirty="0" smtClean="0"/>
-              <a:t>? (2)</a:t>
-            </a:r>
-            <a:endParaRPr lang="en-US" dirty="0"/>
-          </a:p>
-        </p:txBody>
-      </p:sp>
-      <p:sp>
-        <p:nvSpPr>
-          <p:cNvPr id="6" name="Content Placeholder 5"/>
-          <p:cNvSpPr>
-            <a:spLocks noGrp="1"/>
-          </p:cNvSpPr>
-          <p:nvPr>
-            <p:ph idx="1"/>
-          </p:nvPr>
-        </p:nvSpPr>
-        <p:spPr/>
-        <p:txBody>
-          <a:bodyPr>
-            <a:noAutofit/>
-          </a:bodyPr>
-          <a:lstStyle/>
-          <a:p>
-            <a:r>
-              <a:rPr lang="fi-FI" sz="2400" dirty="0" err="1" smtClean="0"/>
-              <a:t>Source</a:t>
-            </a:r>
-            <a:r>
-              <a:rPr lang="fi-FI" sz="2400" dirty="0" smtClean="0"/>
-              <a:t> </a:t>
-            </a:r>
-            <a:r>
-              <a:rPr lang="fi-FI" sz="2400" dirty="0" err="1" smtClean="0"/>
-              <a:t>code</a:t>
-            </a:r>
-            <a:r>
-              <a:rPr lang="fi-FI" sz="2400" dirty="0" smtClean="0"/>
-              <a:t> </a:t>
-            </a:r>
-            <a:r>
-              <a:rPr lang="fi-FI" sz="2400" dirty="0" err="1" smtClean="0"/>
-              <a:t>parsing</a:t>
-            </a:r>
-            <a:r>
-              <a:rPr lang="fi-FI" sz="2400" dirty="0"/>
-              <a:t> </a:t>
-            </a:r>
-            <a:r>
-              <a:rPr lang="fi-FI" sz="2400" dirty="0" smtClean="0"/>
-              <a:t>and </a:t>
-            </a:r>
-            <a:r>
-              <a:rPr lang="fi-FI" sz="2400" dirty="0" err="1" smtClean="0"/>
-              <a:t>dependency</a:t>
-            </a:r>
-            <a:r>
-              <a:rPr lang="fi-FI" sz="2400" dirty="0" smtClean="0"/>
-              <a:t> </a:t>
-            </a:r>
-            <a:r>
-              <a:rPr lang="fi-FI" sz="2400" dirty="0" err="1" smtClean="0"/>
-              <a:t>analysis</a:t>
-            </a:r>
-            <a:endParaRPr lang="fi-FI" sz="2400" dirty="0" smtClean="0"/>
-          </a:p>
-          <a:p>
-            <a:pPr lvl="1"/>
-            <a:r>
-              <a:rPr lang="fi-FI" sz="2000" dirty="0" smtClean="0"/>
-              <a:t>C/C++ and VHDL </a:t>
-            </a:r>
-            <a:r>
-              <a:rPr lang="fi-FI" sz="2000" dirty="0" err="1" smtClean="0"/>
-              <a:t>supported</a:t>
-            </a:r>
-            <a:endParaRPr lang="fi-FI" sz="2000" dirty="0" smtClean="0"/>
-          </a:p>
-          <a:p>
-            <a:r>
-              <a:rPr lang="fi-FI" sz="2400" dirty="0" err="1" smtClean="0"/>
-              <a:t>Ability</a:t>
-            </a:r>
-            <a:r>
-              <a:rPr lang="fi-FI" sz="2400" dirty="0" smtClean="0"/>
-              <a:t> to </a:t>
-            </a:r>
-            <a:r>
-              <a:rPr lang="fi-FI" sz="2400" dirty="0" err="1" smtClean="0"/>
-              <a:t>create</a:t>
-            </a:r>
-            <a:r>
-              <a:rPr lang="fi-FI" sz="2400" dirty="0" smtClean="0"/>
-              <a:t> </a:t>
-            </a:r>
-            <a:r>
-              <a:rPr lang="fi-FI" sz="2400" dirty="0" err="1" smtClean="0"/>
-              <a:t>manual</a:t>
-            </a:r>
-            <a:r>
-              <a:rPr lang="fi-FI" sz="2400" dirty="0" smtClean="0"/>
-              <a:t> </a:t>
-            </a:r>
-            <a:r>
-              <a:rPr lang="fi-FI" sz="2400" dirty="0" err="1" smtClean="0"/>
-              <a:t>dependencies</a:t>
-            </a:r>
-            <a:endParaRPr lang="fi-FI" sz="2400" dirty="0" smtClean="0"/>
-          </a:p>
-          <a:p>
-            <a:pPr lvl="1"/>
-            <a:r>
-              <a:rPr lang="fi-FI" sz="2000" dirty="0" err="1" smtClean="0"/>
-              <a:t>E.g</a:t>
-            </a:r>
-            <a:r>
-              <a:rPr lang="fi-FI" sz="2000" dirty="0" smtClean="0"/>
-              <a:t>. </a:t>
-            </a:r>
-            <a:r>
-              <a:rPr lang="fi-FI" sz="2000" dirty="0" err="1" smtClean="0"/>
-              <a:t>between</a:t>
-            </a:r>
-            <a:r>
-              <a:rPr lang="fi-FI" sz="2000" dirty="0" smtClean="0"/>
-              <a:t> </a:t>
-            </a:r>
-            <a:r>
-              <a:rPr lang="fi-FI" sz="2000" dirty="0" err="1" smtClean="0"/>
-              <a:t>documentation</a:t>
-            </a:r>
-            <a:r>
-              <a:rPr lang="fi-FI" sz="2000" dirty="0" smtClean="0"/>
-              <a:t> and </a:t>
-            </a:r>
-            <a:r>
-              <a:rPr lang="fi-FI" sz="2000" dirty="0" err="1" smtClean="0"/>
-              <a:t>source</a:t>
-            </a:r>
-            <a:r>
-              <a:rPr lang="fi-FI" sz="2000" dirty="0" smtClean="0"/>
-              <a:t> </a:t>
-            </a:r>
-            <a:r>
-              <a:rPr lang="fi-FI" sz="2000" dirty="0" err="1" smtClean="0"/>
-              <a:t>files</a:t>
-            </a:r>
-            <a:endParaRPr lang="fi-FI" sz="2000" dirty="0" smtClean="0"/>
-          </a:p>
-          <a:p>
-            <a:r>
-              <a:rPr lang="fi-FI" sz="2400" dirty="0" err="1" smtClean="0"/>
-              <a:t>Dependency</a:t>
-            </a:r>
-            <a:r>
-              <a:rPr lang="fi-FI" sz="2400" dirty="0" smtClean="0"/>
-              <a:t> </a:t>
-            </a:r>
-            <a:r>
-              <a:rPr lang="fi-FI" sz="2400" dirty="0" err="1" smtClean="0"/>
-              <a:t>visualization</a:t>
-            </a:r>
-            <a:r>
-              <a:rPr lang="fi-FI" sz="2400" dirty="0" smtClean="0"/>
-              <a:t> in a </a:t>
-            </a:r>
-            <a:r>
-              <a:rPr lang="fi-FI" sz="2400" dirty="0" err="1" smtClean="0"/>
-              <a:t>table-graph</a:t>
-            </a:r>
-            <a:r>
-              <a:rPr lang="fi-FI" sz="2400" dirty="0" smtClean="0"/>
-              <a:t> </a:t>
-            </a:r>
-            <a:r>
-              <a:rPr lang="fi-FI" sz="2400" dirty="0" err="1" smtClean="0"/>
-              <a:t>format</a:t>
-            </a:r>
-            <a:r>
-              <a:rPr lang="fi-FI" sz="2400" dirty="0" smtClean="0"/>
-              <a:t>, </a:t>
-            </a:r>
-            <a:r>
-              <a:rPr lang="fi-FI" sz="2400" dirty="0" err="1" smtClean="0"/>
-              <a:t>including</a:t>
-            </a:r>
-            <a:endParaRPr lang="fi-FI" sz="2400" dirty="0" smtClean="0"/>
-          </a:p>
-          <a:p>
-            <a:pPr lvl="1"/>
-            <a:r>
-              <a:rPr lang="fi-FI" sz="2000" dirty="0" err="1" smtClean="0"/>
-              <a:t>Changes</a:t>
-            </a:r>
-            <a:r>
-              <a:rPr lang="fi-FI" sz="2000" dirty="0" smtClean="0"/>
-              <a:t> </a:t>
-            </a:r>
-            <a:r>
-              <a:rPr lang="fi-FI" sz="2000" dirty="0" err="1" smtClean="0"/>
-              <a:t>detection</a:t>
-            </a:r>
-            <a:endParaRPr lang="fi-FI" sz="2000" dirty="0" smtClean="0"/>
-          </a:p>
-          <a:p>
-            <a:pPr lvl="2"/>
-            <a:r>
-              <a:rPr lang="fi-FI" sz="1800" dirty="0" err="1" smtClean="0"/>
-              <a:t>File</a:t>
-            </a:r>
-            <a:r>
-              <a:rPr lang="fi-FI" sz="1800" dirty="0" smtClean="0"/>
-              <a:t> </a:t>
-            </a:r>
-            <a:r>
-              <a:rPr lang="fi-FI" sz="1800" dirty="0" err="1" smtClean="0"/>
-              <a:t>hash</a:t>
-            </a:r>
-            <a:r>
-              <a:rPr lang="fi-FI" sz="1800" dirty="0" smtClean="0"/>
-              <a:t> </a:t>
-            </a:r>
-            <a:r>
-              <a:rPr lang="fi-FI" sz="1800" dirty="0" err="1" smtClean="0"/>
-              <a:t>calculation</a:t>
-            </a:r>
-            <a:endParaRPr lang="fi-FI" sz="1800" dirty="0" smtClean="0"/>
-          </a:p>
-          <a:p>
-            <a:pPr lvl="2"/>
-            <a:r>
-              <a:rPr lang="fi-FI" sz="1800" dirty="0" err="1" smtClean="0"/>
-              <a:t>Dependency</a:t>
-            </a:r>
-            <a:r>
-              <a:rPr lang="fi-FI" sz="1800" dirty="0" smtClean="0"/>
-              <a:t> </a:t>
-            </a:r>
-            <a:r>
-              <a:rPr lang="fi-FI" sz="1800" dirty="0" err="1" smtClean="0"/>
-              <a:t>difference</a:t>
-            </a:r>
-            <a:r>
-              <a:rPr lang="fi-FI" sz="1800" dirty="0" smtClean="0"/>
-              <a:t> </a:t>
-            </a:r>
-            <a:r>
-              <a:rPr lang="fi-FI" sz="1800" dirty="0" err="1" smtClean="0"/>
-              <a:t>view</a:t>
-            </a:r>
-            <a:endParaRPr lang="fi-FI" sz="1800" dirty="0" smtClean="0"/>
-          </a:p>
-          <a:p>
-            <a:pPr lvl="1"/>
-            <a:r>
-              <a:rPr lang="fi-FI" sz="2000" dirty="0" err="1" smtClean="0"/>
-              <a:t>Filtering</a:t>
-            </a:r>
-            <a:endParaRPr lang="fi-FI" sz="2000" dirty="0" smtClean="0"/>
-          </a:p>
-          <a:p>
-            <a:r>
-              <a:rPr lang="fi-FI" sz="2400" dirty="0" err="1" smtClean="0"/>
-              <a:t>All</a:t>
-            </a:r>
-            <a:r>
-              <a:rPr lang="fi-FI" sz="2400" dirty="0" smtClean="0"/>
-              <a:t> </a:t>
-            </a:r>
-            <a:r>
-              <a:rPr lang="fi-FI" sz="2400" dirty="0" err="1" smtClean="0"/>
-              <a:t>this</a:t>
-            </a:r>
-            <a:r>
-              <a:rPr lang="fi-FI" sz="2400" dirty="0" smtClean="0"/>
-              <a:t> </a:t>
-            </a:r>
-            <a:r>
-              <a:rPr lang="fi-FI" sz="2400" dirty="0" err="1" smtClean="0"/>
-              <a:t>represented</a:t>
-            </a:r>
-            <a:r>
-              <a:rPr lang="fi-FI" sz="2400" dirty="0" smtClean="0"/>
-              <a:t> with a </a:t>
-            </a:r>
-            <a:r>
-              <a:rPr lang="fi-FI" sz="2400" dirty="0" err="1" smtClean="0"/>
-              <a:t>clean</a:t>
-            </a:r>
-            <a:r>
-              <a:rPr lang="fi-FI" sz="2400" dirty="0" smtClean="0"/>
-              <a:t>, </a:t>
-            </a:r>
-            <a:r>
-              <a:rPr lang="fi-FI" sz="2400" dirty="0" err="1" smtClean="0"/>
-              <a:t>simple</a:t>
-            </a:r>
-            <a:r>
-              <a:rPr lang="fi-FI" sz="2400" dirty="0" smtClean="0"/>
-              <a:t> UI</a:t>
-            </a:r>
-            <a:endParaRPr lang="en-US" sz="2400" dirty="0"/>
-          </a:p>
-          <a:p>
-            <a:pPr lvl="1"/>
-            <a:r>
-              <a:rPr lang="fi-FI" sz="2000" dirty="0" err="1" smtClean="0"/>
-              <a:t>Fully</a:t>
-            </a:r>
-            <a:r>
-              <a:rPr lang="fi-FI" sz="2000" dirty="0" smtClean="0"/>
-              <a:t> </a:t>
-            </a:r>
-            <a:r>
-              <a:rPr lang="fi-FI" sz="2000" dirty="0" err="1" smtClean="0"/>
-              <a:t>integrated</a:t>
-            </a:r>
-            <a:r>
-              <a:rPr lang="fi-FI" sz="2000" dirty="0" smtClean="0"/>
-              <a:t> into Kactus2</a:t>
-            </a:r>
-          </a:p>
-        </p:txBody>
-      </p:sp>
-      <p:sp>
-        <p:nvSpPr>
-          <p:cNvPr id="4" name="Slide Number Placeholder 3"/>
-          <p:cNvSpPr>
-            <a:spLocks noGrp="1"/>
-          </p:cNvSpPr>
-          <p:nvPr>
-            <p:ph type="sldNum" sz="quarter" idx="11"/>
-          </p:nvPr>
-        </p:nvSpPr>
-        <p:spPr/>
-        <p:txBody>
-          <a:bodyPr/>
-          <a:lstStyle/>
-          <a:p>
-            <a:fld id="{396A2528-BFCE-4DA1-8CA6-E7CCE78C7A79}" type="slidenum">
-              <a:rPr lang="fi-FI" smtClean="0"/>
-              <a:pPr/>
-              <a:t>7</a:t>
-            </a:fld>
-            <a:endParaRPr lang="fi-FI" dirty="0"/>
-          </a:p>
-        </p:txBody>
-      </p:sp>
-    </p:spTree>
-    <p:extLst>
-      <p:ext uri="{BB962C8B-B14F-4D97-AF65-F5344CB8AC3E}">
-        <p14:creationId xmlns:p14="http://schemas.microsoft.com/office/powerpoint/2010/main" val="1245235701"/>
-      </p:ext>
-    </p:extLst>
-  </p:cSld>
-  <p:clrMapOvr>
-    <a:masterClrMapping/>
-  </p:clrMapOvr>
-  <p:transition>
-    <p:zoom/>
-  </p:transition>
-  <p:timing>
-    <p:tnLst>
-      <p:par>
-        <p:cTn id="1" dur="indefinite" restart="never" nodeType="tmRoot"/>
-      </p:par>
-    </p:tnLst>
-  </p:timing>
-</p:sld>
-</file>
-
 <file path=ppt/slides/slide8.xml><?xml version="1.0" encoding="utf-8"?>
 <p:sld xmlns:a="http://schemas.openxmlformats.org/drawingml/2006/main" xmlns:r="http://schemas.openxmlformats.org/officeDocument/2006/relationships" xmlns:p="http://schemas.openxmlformats.org/presentationml/2006/main">
   <p:cSld>
@@ -9640,7 +9821,7 @@
           <a:p>
             <a:r>
               <a:rPr lang="fi-FI" dirty="0" err="1" smtClean="0"/>
-              <a:t>Problems</a:t>
+              <a:t>What</a:t>
             </a:r>
             <a:r>
               <a:rPr lang="fi-FI" dirty="0" smtClean="0"/>
@@ -9648,11 +9829,19 @@
             </a:r>
             <a:r>
               <a:rPr lang="fi-FI" dirty="0" err="1" smtClean="0"/>
-              <a:t>Met</a:t>
+              <a:t>was</a:t>
             </a:r>
             <a:r>
               <a:rPr lang="fi-FI" dirty="0" smtClean="0"/>
-              <a:t> and Solutions</a:t>
+              <a:t> </a:t>
+            </a:r>
+            <a:r>
+              <a:rPr lang="fi-FI" dirty="0" err="1" smtClean="0"/>
+              <a:t>done</a:t>
+            </a:r>
+            <a:r>
+              <a:rPr lang="fi-FI" dirty="0" smtClean="0"/>
+              <a:t>? (2)</a:t>
             </a:r>
             <a:endParaRPr lang="en-US" dirty="0"/>
           </a:p>
@@ -9671,121 +9860,13 @@
         <p:spPr/>
         <p:txBody>
           <a:bodyPr>
-            <a:normAutofit/>
+            <a:noAutofit/>
           </a:bodyPr>
           <a:lstStyle/>
           <a:p>
             <a:r>
-              <a:rPr lang="fi-FI" sz="3200" dirty="0" err="1" smtClean="0"/>
-              <a:t>Not</a:t>
-            </a:r>
-            <a:r>
-              <a:rPr lang="fi-FI" sz="3200" dirty="0" smtClean="0"/>
-              <a:t> </a:t>
-            </a:r>
-            <a:r>
-              <a:rPr lang="fi-FI" sz="3200" dirty="0" err="1" smtClean="0"/>
-              <a:t>always</a:t>
-            </a:r>
-            <a:r>
-              <a:rPr lang="fi-FI" sz="3200" dirty="0" smtClean="0"/>
-              <a:t> </a:t>
-            </a:r>
-            <a:r>
-              <a:rPr lang="fi-FI" sz="3200" dirty="0" err="1" smtClean="0"/>
-              <a:t>enough</a:t>
-            </a:r>
-            <a:r>
-              <a:rPr lang="fi-FI" sz="3200" dirty="0" smtClean="0"/>
-              <a:t> </a:t>
-            </a:r>
-            <a:r>
-              <a:rPr lang="fi-FI" sz="3200" dirty="0" err="1" smtClean="0"/>
-              <a:t>tim</a:t>
-            </a:r>
-            <a:r>
-              <a:rPr lang="fi-FI" sz="3200" dirty="0" err="1" smtClean="0"/>
-              <a:t>e</a:t>
-            </a:r>
-            <a:r>
-              <a:rPr lang="fi-FI" sz="3200" dirty="0" smtClean="0"/>
-              <a:t> to </a:t>
-            </a:r>
-            <a:r>
-              <a:rPr lang="fi-FI" sz="3200" dirty="0" err="1" smtClean="0"/>
-              <a:t>work</a:t>
-            </a:r>
-            <a:r>
-              <a:rPr lang="fi-FI" sz="3200" dirty="0" smtClean="0"/>
-              <a:t> for the </a:t>
-            </a:r>
-            <a:r>
-              <a:rPr lang="fi-FI" sz="3200" dirty="0" err="1" smtClean="0"/>
-              <a:t>project</a:t>
-            </a:r>
-            <a:endParaRPr lang="fi-FI" sz="3200" dirty="0" smtClean="0"/>
-          </a:p>
-          <a:p>
-            <a:pPr lvl="1"/>
-            <a:r>
-              <a:rPr lang="fi-FI" sz="2800" dirty="0" err="1" smtClean="0"/>
-              <a:t>Was</a:t>
-            </a:r>
-            <a:r>
-              <a:rPr lang="fi-FI" sz="2800" dirty="0" smtClean="0"/>
-              <a:t> </a:t>
-            </a:r>
-            <a:r>
-              <a:rPr lang="fi-FI" sz="2800" dirty="0" err="1" smtClean="0"/>
-              <a:t>compensated</a:t>
-            </a:r>
-            <a:r>
-              <a:rPr lang="fi-FI" sz="2800" dirty="0" smtClean="0"/>
-              <a:t> </a:t>
-            </a:r>
-            <a:r>
-              <a:rPr lang="fi-FI" sz="2800" dirty="0" err="1" smtClean="0"/>
-              <a:t>by</a:t>
-            </a:r>
-            <a:r>
-              <a:rPr lang="fi-FI" sz="2800" dirty="0" smtClean="0"/>
-              <a:t> </a:t>
-            </a:r>
-            <a:r>
-              <a:rPr lang="fi-FI" sz="2800" dirty="0" err="1" smtClean="0"/>
-              <a:t>team</a:t>
-            </a:r>
-            <a:r>
-              <a:rPr lang="fi-FI" sz="2800" dirty="0" smtClean="0"/>
-              <a:t> </a:t>
-            </a:r>
-            <a:r>
-              <a:rPr lang="fi-FI" sz="2800" dirty="0" err="1" smtClean="0"/>
-              <a:t>efficiency</a:t>
-            </a:r>
-            <a:r>
-              <a:rPr lang="fi-FI" sz="2800" dirty="0" smtClean="0"/>
-              <a:t> and </a:t>
-            </a:r>
-            <a:r>
-              <a:rPr lang="fi-FI" sz="2800" dirty="0" err="1" smtClean="0"/>
-              <a:t>careful</a:t>
-            </a:r>
-            <a:r>
-              <a:rPr lang="fi-FI" sz="2800" dirty="0" smtClean="0"/>
-              <a:t> </a:t>
-            </a:r>
-            <a:r>
-              <a:rPr lang="fi-FI" sz="2800" dirty="0" err="1" smtClean="0"/>
-              <a:t>implementation</a:t>
-            </a:r>
-            <a:endParaRPr lang="fi-FI" sz="2800" dirty="0" smtClean="0"/>
-          </a:p>
-          <a:p>
-            <a:pPr lvl="2"/>
-            <a:r>
               <a:rPr lang="fi-FI" sz="2400" dirty="0" err="1" smtClean="0"/>
-              <a:t>Tasks</a:t>
+              <a:t>Source</a:t>
             </a:r>
             <a:r>
               <a:rPr lang="fi-FI" sz="2400" dirty="0" smtClean="0"/>
@@ -9793,7 +9874,7 @@
             </a:r>
             <a:r>
               <a:rPr lang="fi-FI" sz="2400" dirty="0" err="1" smtClean="0"/>
-              <a:t>required</a:t>
+              <a:t>code</a:t>
             </a:r>
             <a:r>
               <a:rPr lang="fi-FI" sz="2400" dirty="0" smtClean="0"/>
@@ -9801,7 +9882,19 @@
             </a:r>
             <a:r>
               <a:rPr lang="fi-FI" sz="2400" dirty="0" err="1" smtClean="0"/>
-              <a:t>less</a:t>
+              <a:t>parsing</a:t>
+            </a:r>
+            <a:r>
+              <a:rPr lang="fi-FI" sz="2400" dirty="0"/>
+              <a:t> </a:t>
+            </a:r>
+            <a:r>
+              <a:rPr lang="fi-FI" sz="2400" dirty="0" smtClean="0"/>
+              <a:t>and </a:t>
+            </a:r>
+            <a:r>
+              <a:rPr lang="fi-FI" sz="2400" dirty="0" err="1" smtClean="0"/>
+              <a:t>dependency</a:t>
             </a:r>
             <a:r>
               <a:rPr lang="fi-FI" sz="2400" dirty="0" smtClean="0"/>
@@ -9809,7 +9902,34 @@
             </a:r>
             <a:r>
               <a:rPr lang="fi-FI" sz="2400" dirty="0" err="1" smtClean="0"/>
-              <a:t>time</a:t>
+              <a:t>analysis</a:t>
+            </a:r>
+            <a:endParaRPr lang="fi-FI" sz="2400" dirty="0" smtClean="0"/>
+          </a:p>
+          <a:p>
+            <a:pPr lvl="1"/>
+            <a:r>
+              <a:rPr lang="fi-FI" sz="2000" dirty="0" smtClean="0"/>
+              <a:t>C/C++ and VHDL </a:t>
+            </a:r>
+            <a:r>
+              <a:rPr lang="fi-FI" sz="2000" dirty="0" err="1" smtClean="0"/>
+              <a:t>supported</a:t>
+            </a:r>
+            <a:endParaRPr lang="fi-FI" sz="2000" dirty="0" smtClean="0"/>
+          </a:p>
+          <a:p>
+            <a:r>
+              <a:rPr lang="fi-FI" sz="2400" dirty="0" err="1" smtClean="0"/>
+              <a:t>Ability</a:t>
+            </a:r>
+            <a:r>
+              <a:rPr lang="fi-FI" sz="2400" dirty="0" smtClean="0"/>
+              <a:t> to </a:t>
+            </a:r>
+            <a:r>
+              <a:rPr lang="fi-FI" sz="2400" dirty="0" err="1" smtClean="0"/>
+              <a:t>create</a:t>
             </a:r>
             <a:r>
               <a:rPr lang="fi-FI" sz="2400" dirty="0" smtClean="0"/>
@@ -9817,7 +9937,7 @@
             </a:r>
             <a:r>
               <a:rPr lang="fi-FI" sz="2400" dirty="0" err="1" smtClean="0"/>
-              <a:t>than</a:t>
+              <a:t>manual</a:t>
             </a:r>
             <a:r>
               <a:rPr lang="fi-FI" sz="2400" dirty="0" smtClean="0"/>
@@ -9825,15 +9945,54 @@
             </a:r>
             <a:r>
               <a:rPr lang="fi-FI" sz="2400" dirty="0" err="1" smtClean="0"/>
-              <a:t>expected</a:t>
+              <a:t>dependencies</a:t>
             </a:r>
             <a:endParaRPr lang="fi-FI" sz="2400" dirty="0" smtClean="0"/>
           </a:p>
           <a:p>
-            <a:pPr lvl="2"/>
+            <a:pPr lvl="1"/>
+            <a:r>
+              <a:rPr lang="fi-FI" sz="2000" dirty="0" err="1" smtClean="0"/>
+              <a:t>E.g</a:t>
+            </a:r>
+            <a:r>
+              <a:rPr lang="fi-FI" sz="2000" dirty="0" smtClean="0"/>
+              <a:t>. </a:t>
+            </a:r>
+            <a:r>
+              <a:rPr lang="fi-FI" sz="2000" dirty="0" err="1" smtClean="0"/>
+              <a:t>between</a:t>
+            </a:r>
+            <a:r>
+              <a:rPr lang="fi-FI" sz="2000" dirty="0" smtClean="0"/>
+              <a:t> </a:t>
+            </a:r>
+            <a:r>
+              <a:rPr lang="fi-FI" sz="2000" dirty="0" err="1" smtClean="0"/>
+              <a:t>documentation</a:t>
+            </a:r>
+            <a:r>
+              <a:rPr lang="fi-FI" sz="2000" dirty="0" smtClean="0"/>
+              <a:t> and </a:t>
+            </a:r>
+            <a:r>
+              <a:rPr lang="fi-FI" sz="2000" dirty="0" err="1" smtClean="0"/>
+              <a:t>source</a:t>
+            </a:r>
+            <a:r>
+              <a:rPr lang="fi-FI" sz="2000" dirty="0" smtClean="0"/>
+              <a:t> </a:t>
+            </a:r>
+            <a:r>
+              <a:rPr lang="fi-FI" sz="2000" dirty="0" err="1" smtClean="0"/>
+              <a:t>files</a:t>
+            </a:r>
+            <a:endParaRPr lang="fi-FI" sz="2000" dirty="0" smtClean="0"/>
+          </a:p>
+          <a:p>
             <a:r>
               <a:rPr lang="fi-FI" sz="2400" dirty="0" err="1" smtClean="0"/>
-              <a:t>It</a:t>
+              <a:t>Dependency</a:t>
             </a:r>
             <a:r>
               <a:rPr lang="fi-FI" sz="2400" dirty="0" smtClean="0"/>
@@ -9841,7 +10000,15 @@
             </a:r>
             <a:r>
               <a:rPr lang="fi-FI" sz="2400" dirty="0" err="1" smtClean="0"/>
-              <a:t>was</a:t>
+              <a:t>visualization</a:t>
+            </a:r>
+            <a:r>
+              <a:rPr lang="fi-FI" sz="2400" dirty="0" smtClean="0"/>
+              <a:t> in a </a:t>
+            </a:r>
+            <a:r>
+              <a:rPr lang="fi-FI" sz="2400" dirty="0" err="1" smtClean="0"/>
+              <a:t>table-graph</a:t>
             </a:r>
             <a:r>
               <a:rPr lang="fi-FI" sz="2400" dirty="0" smtClean="0"/>
@@ -9849,15 +10016,94 @@
             </a:r>
             <a:r>
               <a:rPr lang="fi-FI" sz="2400" dirty="0" err="1" smtClean="0"/>
-              <a:t>possible</a:t>
+              <a:t>format</a:t>
             </a:r>
             <a:r>
               <a:rPr lang="fi-FI" sz="2400" dirty="0" smtClean="0"/>
-              <a:t> to </a:t>
+              <a:t>, </a:t>
             </a:r>
             <a:r>
               <a:rPr lang="fi-FI" sz="2400" dirty="0" err="1" smtClean="0"/>
-              <a:t>reuse</a:t>
+              <a:t>including</a:t>
+            </a:r>
+            <a:endParaRPr lang="fi-FI" sz="2400" dirty="0" smtClean="0"/>
+          </a:p>
+          <a:p>
+            <a:pPr lvl="1"/>
+            <a:r>
+              <a:rPr lang="fi-FI" sz="2000" dirty="0" err="1" smtClean="0"/>
+              <a:t>Changes</a:t>
+            </a:r>
+            <a:r>
+              <a:rPr lang="fi-FI" sz="2000" dirty="0" smtClean="0"/>
+              <a:t> </a:t>
+            </a:r>
+            <a:r>
+              <a:rPr lang="fi-FI" sz="2000" dirty="0" err="1" smtClean="0"/>
+              <a:t>detection</a:t>
+            </a:r>
+            <a:endParaRPr lang="fi-FI" sz="2000" dirty="0" smtClean="0"/>
+          </a:p>
+          <a:p>
+            <a:pPr lvl="2"/>
+            <a:r>
+              <a:rPr lang="fi-FI" sz="1800" dirty="0" err="1" smtClean="0"/>
+              <a:t>File</a:t>
+            </a:r>
+            <a:r>
+              <a:rPr lang="fi-FI" sz="1800" dirty="0" smtClean="0"/>
+              <a:t> </a:t>
+            </a:r>
+            <a:r>
+              <a:rPr lang="fi-FI" sz="1800" dirty="0" err="1" smtClean="0"/>
+              <a:t>hash</a:t>
+            </a:r>
+            <a:r>
+              <a:rPr lang="fi-FI" sz="1800" dirty="0" smtClean="0"/>
+              <a:t> </a:t>
+            </a:r>
+            <a:r>
+              <a:rPr lang="fi-FI" sz="1800" dirty="0" err="1" smtClean="0"/>
+              <a:t>calculation</a:t>
+            </a:r>
+            <a:endParaRPr lang="fi-FI" sz="1800" dirty="0" smtClean="0"/>
+          </a:p>
+          <a:p>
+            <a:pPr lvl="2"/>
+            <a:r>
+              <a:rPr lang="fi-FI" sz="1800" dirty="0" err="1" smtClean="0"/>
+              <a:t>Dependency</a:t>
+            </a:r>
+            <a:r>
+              <a:rPr lang="fi-FI" sz="1800" dirty="0" smtClean="0"/>
+              <a:t> </a:t>
+            </a:r>
+            <a:r>
+              <a:rPr lang="fi-FI" sz="1800" dirty="0" err="1" smtClean="0"/>
+              <a:t>difference</a:t>
+            </a:r>
+            <a:r>
+              <a:rPr lang="fi-FI" sz="1800" dirty="0" smtClean="0"/>
+              <a:t> </a:t>
+            </a:r>
+            <a:r>
+              <a:rPr lang="fi-FI" sz="1800" dirty="0" err="1" smtClean="0"/>
+              <a:t>view</a:t>
+            </a:r>
+            <a:endParaRPr lang="fi-FI" sz="1800" dirty="0" smtClean="0"/>
+          </a:p>
+          <a:p>
+            <a:pPr lvl="1"/>
+            <a:r>
+              <a:rPr lang="fi-FI" sz="2000" dirty="0" err="1" smtClean="0"/>
+              <a:t>Filtering</a:t>
+            </a:r>
+            <a:endParaRPr lang="fi-FI" sz="2000" dirty="0" smtClean="0"/>
+          </a:p>
+          <a:p>
+            <a:r>
+              <a:rPr lang="fi-FI" sz="2400" dirty="0" err="1" smtClean="0"/>
+              <a:t>All</a:t>
             </a:r>
             <a:r>
               <a:rPr lang="fi-FI" sz="2400" dirty="0" smtClean="0"/>
@@ -9865,7 +10111,7 @@
             </a:r>
             <a:r>
               <a:rPr lang="fi-FI" sz="2400" dirty="0" err="1" smtClean="0"/>
-              <a:t>more</a:t>
+              <a:t>this</a:t>
             </a:r>
             <a:r>
               <a:rPr lang="fi-FI" sz="2400" dirty="0" smtClean="0"/>
@@ -9873,49 +10119,48 @@
             </a:r>
             <a:r>
               <a:rPr lang="fi-FI" sz="2400" dirty="0" err="1" smtClean="0"/>
-              <a:t>features</a:t>
+              <a:t>represented</a:t>
             </a:r>
             <a:r>
               <a:rPr lang="fi-FI" sz="2400" dirty="0" smtClean="0"/>
+              <a:t> with a </a:t>
+            </a:r>
+            <a:r>
+              <a:rPr lang="fi-FI" sz="2400" dirty="0" err="1" smtClean="0"/>
+              <a:t>clean</a:t>
+            </a:r>
+            <a:r>
+              <a:rPr lang="fi-FI" sz="2400" dirty="0" smtClean="0"/>
+              <a:t>, </a:t>
+            </a:r>
+            <a:r>
+              <a:rPr lang="fi-FI" sz="2400" dirty="0" err="1" smtClean="0"/>
+              <a:t>simple</a:t>
+            </a:r>
+            <a:r>
+              <a:rPr lang="fi-FI" sz="2400" dirty="0" smtClean="0"/>
+              <a:t> UI</a:t>
+            </a:r>
+            <a:endParaRPr lang="en-US" sz="2400" dirty="0"/>
+          </a:p>
+          <a:p>
+            <a:pPr lvl="1"/>
+            <a:r>
+              <a:rPr lang="fi-FI" sz="2000" dirty="0" err="1" smtClean="0"/>
+              <a:t>Fully</a:t>
+            </a:r>
+            <a:r>
+              <a:rPr lang="fi-FI" sz="2000" dirty="0" smtClean="0"/>
               <a:t> </a:t>
             </a:r>
             <a:r>
-              <a:rPr lang="fi-FI" sz="2400" dirty="0" err="1" smtClean="0"/>
-              <a:t>from</a:t>
-            </a:r>
-            <a:r>
-              <a:rPr lang="fi-FI" sz="2400" dirty="0" smtClean="0"/>
-              <a:t> </a:t>
-            </a:r>
-            <a:r>
-              <a:rPr lang="fi-FI" sz="2400" dirty="0" err="1" smtClean="0"/>
-              <a:t>Qt</a:t>
-            </a:r>
-            <a:r>
-              <a:rPr lang="fi-FI" sz="2400" dirty="0" smtClean="0"/>
-              <a:t> </a:t>
-            </a:r>
-            <a:r>
-              <a:rPr lang="fi-FI" sz="2400" dirty="0" err="1" smtClean="0"/>
-              <a:t>than</a:t>
-            </a:r>
-            <a:r>
-              <a:rPr lang="fi-FI" sz="2400" dirty="0" smtClean="0"/>
-              <a:t> </a:t>
-            </a:r>
-            <a:r>
-              <a:rPr lang="fi-FI" sz="2400" dirty="0" err="1" smtClean="0"/>
-              <a:t>was</a:t>
-            </a:r>
-            <a:r>
-              <a:rPr lang="fi-FI" sz="2400" dirty="0" smtClean="0"/>
-              <a:t> </a:t>
-            </a:r>
-            <a:r>
-              <a:rPr lang="fi-FI" sz="2400" dirty="0" err="1" smtClean="0"/>
-              <a:t>assumed</a:t>
-            </a:r>
-            <a:endParaRPr lang="fi-FI" sz="2400" dirty="0" smtClean="0"/>
+              <a:rPr lang="fi-FI" sz="2000" dirty="0" err="1" smtClean="0"/>
+              <a:t>integrated</a:t>
+            </a:r>
+            <a:r>
+              <a:rPr lang="fi-FI" sz="2000" dirty="0" smtClean="0"/>
+              <a:t> into Kactus2</a:t>
+            </a:r>
           </a:p>
         </p:txBody>
       </p:sp>
@@ -9946,7 +10191,7 @@
     </p:spTree>
     <p:extLst>
       <p:ext uri="{BB962C8B-B14F-4D97-AF65-F5344CB8AC3E}">
-        <p14:creationId xmlns:p14="http://schemas.microsoft.com/office/powerpoint/2010/main" val="1030595415"/>
+        <p14:creationId xmlns:p14="http://schemas.microsoft.com/office/powerpoint/2010/main" val="1245235701"/>
       </p:ext>
     </p:extLst>
   </p:cSld>
@@ -10000,7 +10245,7 @@
           <a:p>
             <a:r>
               <a:rPr lang="fi-FI" dirty="0" err="1" smtClean="0"/>
-              <a:t>Realized</a:t>
+              <a:t>Problems</a:t>
             </a:r>
             <a:r>
               <a:rPr lang="fi-FI" dirty="0" smtClean="0"/>
@@ -10008,7 +10253,11 @@
             </a:r>
             <a:r>
               <a:rPr lang="fi-FI" dirty="0" err="1" smtClean="0"/>
-              <a:t>Risks</a:t>
+              <a:t>Met</a:t>
+            </a:r>
+            <a:r>
+              <a:rPr lang="fi-FI" dirty="0" smtClean="0"/>
+              <a:t> and Solutions</a:t>
             </a:r>
             <a:endParaRPr lang="en-US" dirty="0"/>
           </a:p>
@@ -10032,78 +10281,242 @@
           <a:lstStyle/>
           <a:p>
             <a:r>
-              <a:rPr lang="en-US" dirty="0" smtClean="0"/>
-              <a:t>Sickness</a:t>
-            </a:r>
+              <a:rPr lang="fi-FI" sz="3200" dirty="0" err="1" smtClean="0"/>
+              <a:t>Not</a:t>
+            </a:r>
+            <a:r>
+              <a:rPr lang="fi-FI" sz="3200" dirty="0" smtClean="0"/>
+              <a:t> </a:t>
+            </a:r>
+            <a:r>
+              <a:rPr lang="fi-FI" sz="3200" dirty="0" err="1" smtClean="0"/>
+              <a:t>always</a:t>
+            </a:r>
+            <a:r>
+              <a:rPr lang="fi-FI" sz="3200" dirty="0" smtClean="0"/>
+              <a:t> </a:t>
+            </a:r>
+            <a:r>
+              <a:rPr lang="fi-FI" sz="3200" dirty="0" err="1" smtClean="0"/>
+              <a:t>enough</a:t>
+            </a:r>
+            <a:r>
+              <a:rPr lang="fi-FI" sz="3200" dirty="0" smtClean="0"/>
+              <a:t> </a:t>
+            </a:r>
+            <a:r>
+              <a:rPr lang="fi-FI" sz="3200" dirty="0" err="1" smtClean="0"/>
+              <a:t>time</a:t>
+            </a:r>
+            <a:r>
+              <a:rPr lang="fi-FI" sz="3200" dirty="0" smtClean="0"/>
+              <a:t> to </a:t>
+            </a:r>
+            <a:r>
+              <a:rPr lang="fi-FI" sz="3200" dirty="0" err="1" smtClean="0"/>
+              <a:t>work</a:t>
+            </a:r>
+            <a:r>
+              <a:rPr lang="fi-FI" sz="3200" dirty="0" smtClean="0"/>
+              <a:t> for the </a:t>
+            </a:r>
+            <a:r>
+              <a:rPr lang="fi-FI" sz="3200" dirty="0" err="1" smtClean="0"/>
+              <a:t>project</a:t>
+            </a:r>
+            <a:endParaRPr lang="fi-FI" sz="3200" dirty="0" smtClean="0"/>
           </a:p>
           <a:p>
             <a:pPr lvl="1"/>
             <a:r>
-              <a:rPr lang="en-US" dirty="0" smtClean="0">
-                <a:sym typeface="Wingdings" pitchFamily="2" charset="2"/>
-              </a:rPr>
-              <a:t>Caused one week delay</a:t>
-            </a:r>
-            <a:r>
-              <a:rPr lang="en-US" dirty="0" smtClean="0">
-                <a:sym typeface="Wingdings" pitchFamily="2" charset="2"/>
-              </a:rPr>
-              <a:t> which was compensated later on</a:t>
-            </a:r>
-          </a:p>
-          <a:p>
-            <a:r>
-              <a:rPr lang="en-US" dirty="0" smtClean="0">
-                <a:sym typeface="Wingdings" pitchFamily="2" charset="2"/>
-              </a:rPr>
-              <a:t>Development server downtime</a:t>
-            </a:r>
-          </a:p>
-          <a:p>
-            <a:pPr lvl="1"/>
-            <a:r>
-              <a:rPr lang="en-US" dirty="0" err="1" smtClean="0">
-                <a:sym typeface="Wingdings" pitchFamily="2" charset="2"/>
-              </a:rPr>
-              <a:t>Sourceforge</a:t>
-            </a:r>
-            <a:r>
-              <a:rPr lang="en-US" dirty="0" smtClean="0">
-                <a:sym typeface="Wingdings" pitchFamily="2" charset="2"/>
-              </a:rPr>
-              <a:t> (version control) was temporarily down</a:t>
-            </a:r>
-          </a:p>
-          <a:p>
-            <a:pPr lvl="1"/>
-            <a:r>
-              <a:rPr lang="en-US" dirty="0" smtClean="0">
-                <a:sym typeface="Wingdings" pitchFamily="2" charset="2"/>
-              </a:rPr>
-              <a:t>Hostedredmine.com (project management) was down</a:t>
-            </a:r>
-          </a:p>
-          <a:p>
-            <a:pPr lvl="1"/>
-            <a:r>
-              <a:rPr lang="en-US" dirty="0" smtClean="0">
-                <a:sym typeface="Wingdings" pitchFamily="2" charset="2"/>
-              </a:rPr>
-              <a:t>No severe effects</a:t>
-            </a:r>
-          </a:p>
-          <a:p>
-            <a:endParaRPr lang="en-US" dirty="0">
-              <a:sym typeface="Wingdings" pitchFamily="2" charset="2"/>
-            </a:endParaRPr>
-          </a:p>
-          <a:p>
-            <a:pPr marL="0" indent="0">
-              <a:buNone/>
-            </a:pPr>
-            <a:endParaRPr lang="fi-FI" dirty="0" smtClean="0">
-              <a:sym typeface="Wingdings" pitchFamily="2" charset="2"/>
-            </a:endParaRPr>
+              <a:rPr lang="fi-FI" sz="2800" dirty="0" err="1" smtClean="0"/>
+              <a:t>Was</a:t>
+            </a:r>
+            <a:r>
+              <a:rPr lang="fi-FI" sz="2800" dirty="0" smtClean="0"/>
+              <a:t> </a:t>
+            </a:r>
+            <a:r>
+              <a:rPr lang="fi-FI" sz="2800" dirty="0" err="1" smtClean="0"/>
+              <a:t>compensated</a:t>
+            </a:r>
+            <a:r>
+              <a:rPr lang="fi-FI" sz="2800" dirty="0" smtClean="0"/>
+              <a:t> </a:t>
+            </a:r>
+            <a:r>
+              <a:rPr lang="fi-FI" sz="2800" dirty="0" err="1" smtClean="0"/>
+              <a:t>by</a:t>
+            </a:r>
+            <a:r>
+              <a:rPr lang="fi-FI" sz="2800" dirty="0" smtClean="0"/>
+              <a:t> </a:t>
+            </a:r>
+            <a:r>
+              <a:rPr lang="fi-FI" sz="2800" dirty="0" err="1" smtClean="0"/>
+              <a:t>team</a:t>
+            </a:r>
+            <a:r>
+              <a:rPr lang="fi-FI" sz="2800" dirty="0" smtClean="0"/>
+              <a:t> </a:t>
+            </a:r>
+            <a:r>
+              <a:rPr lang="fi-FI" sz="2800" dirty="0" err="1" smtClean="0"/>
+              <a:t>efficiency</a:t>
+            </a:r>
+            <a:r>
+              <a:rPr lang="fi-FI" sz="2800" dirty="0" smtClean="0"/>
+              <a:t> and </a:t>
+            </a:r>
+            <a:r>
+              <a:rPr lang="fi-FI" sz="2800" dirty="0" err="1" smtClean="0"/>
+              <a:t>careful</a:t>
+            </a:r>
+            <a:r>
+              <a:rPr lang="fi-FI" sz="2800" dirty="0" smtClean="0"/>
+              <a:t> </a:t>
+            </a:r>
+            <a:r>
+              <a:rPr lang="fi-FI" sz="2800" dirty="0" err="1" smtClean="0"/>
+              <a:t>implementation</a:t>
+            </a:r>
+            <a:endParaRPr lang="fi-FI" sz="2800" dirty="0" smtClean="0"/>
+          </a:p>
+          <a:p>
+            <a:pPr lvl="2"/>
+            <a:r>
+              <a:rPr lang="fi-FI" sz="2400" dirty="0" err="1" smtClean="0"/>
+              <a:t>Tasks</a:t>
+            </a:r>
+            <a:r>
+              <a:rPr lang="fi-FI" sz="2400" dirty="0" smtClean="0"/>
+              <a:t> </a:t>
+            </a:r>
+            <a:r>
+              <a:rPr lang="fi-FI" sz="2400" dirty="0" err="1" smtClean="0"/>
+              <a:t>required</a:t>
+            </a:r>
+            <a:r>
+              <a:rPr lang="fi-FI" sz="2400" dirty="0" smtClean="0"/>
+              <a:t> </a:t>
+            </a:r>
+            <a:r>
+              <a:rPr lang="fi-FI" sz="2400" dirty="0" err="1" smtClean="0"/>
+              <a:t>less</a:t>
+            </a:r>
+            <a:r>
+              <a:rPr lang="fi-FI" sz="2400" dirty="0" smtClean="0"/>
+              <a:t> </a:t>
+            </a:r>
+            <a:r>
+              <a:rPr lang="fi-FI" sz="2400" dirty="0" err="1" smtClean="0"/>
+              <a:t>time</a:t>
+            </a:r>
+            <a:r>
+              <a:rPr lang="fi-FI" sz="2400" dirty="0" smtClean="0"/>
+              <a:t> </a:t>
+            </a:r>
+            <a:r>
+              <a:rPr lang="fi-FI" sz="2400" dirty="0" err="1" smtClean="0"/>
+              <a:t>than</a:t>
+            </a:r>
+            <a:r>
+              <a:rPr lang="fi-FI" sz="2400" dirty="0" smtClean="0"/>
+              <a:t> </a:t>
+            </a:r>
+            <a:r>
+              <a:rPr lang="fi-FI" sz="2400" dirty="0" err="1" smtClean="0"/>
+              <a:t>expected</a:t>
+            </a:r>
+            <a:endParaRPr lang="fi-FI" sz="2400" dirty="0" smtClean="0"/>
+          </a:p>
+          <a:p>
+            <a:pPr lvl="2"/>
+            <a:r>
+              <a:rPr lang="fi-FI" sz="2400" dirty="0" err="1" smtClean="0"/>
+              <a:t>It</a:t>
+            </a:r>
+            <a:r>
+              <a:rPr lang="fi-FI" sz="2400" dirty="0" smtClean="0"/>
+              <a:t> </a:t>
+            </a:r>
+            <a:r>
+              <a:rPr lang="fi-FI" sz="2400" dirty="0" err="1" smtClean="0"/>
+              <a:t>was</a:t>
+            </a:r>
+            <a:r>
+              <a:rPr lang="fi-FI" sz="2400" dirty="0" smtClean="0"/>
+              <a:t> </a:t>
+            </a:r>
+            <a:r>
+              <a:rPr lang="fi-FI" sz="2400" dirty="0" err="1" smtClean="0"/>
+              <a:t>possible</a:t>
+            </a:r>
+            <a:r>
+              <a:rPr lang="fi-FI" sz="2400" dirty="0" smtClean="0"/>
+              <a:t> to </a:t>
+            </a:r>
+            <a:r>
+              <a:rPr lang="fi-FI" sz="2400" dirty="0" err="1" smtClean="0"/>
+              <a:t>reuse</a:t>
+            </a:r>
+            <a:r>
+              <a:rPr lang="fi-FI" sz="2400" dirty="0" smtClean="0"/>
+              <a:t> </a:t>
+            </a:r>
+            <a:r>
+              <a:rPr lang="fi-FI" sz="2400" dirty="0" err="1" smtClean="0"/>
+              <a:t>more</a:t>
+            </a:r>
+            <a:r>
+              <a:rPr lang="fi-FI" sz="2400" dirty="0" smtClean="0"/>
+              <a:t> </a:t>
+            </a:r>
+            <a:r>
+              <a:rPr lang="fi-FI" sz="2400" dirty="0" err="1" smtClean="0"/>
+              <a:t>features</a:t>
+            </a:r>
+            <a:r>
+              <a:rPr lang="fi-FI" sz="2400" dirty="0" smtClean="0"/>
+              <a:t> </a:t>
+            </a:r>
+            <a:r>
+              <a:rPr lang="fi-FI" sz="2400" dirty="0" err="1" smtClean="0"/>
+              <a:t>from</a:t>
+            </a:r>
+            <a:r>
+              <a:rPr lang="fi-FI" sz="2400" dirty="0" smtClean="0"/>
+              <a:t> </a:t>
+            </a:r>
+            <a:r>
+              <a:rPr lang="fi-FI" sz="2400" dirty="0" err="1" smtClean="0"/>
+              <a:t>Qt</a:t>
+            </a:r>
+            <a:r>
+              <a:rPr lang="fi-FI" sz="2400" dirty="0" smtClean="0"/>
+              <a:t> </a:t>
+            </a:r>
+            <a:r>
+              <a:rPr lang="fi-FI" sz="2400" dirty="0" err="1" smtClean="0"/>
+              <a:t>than</a:t>
+            </a:r>
+            <a:r>
+              <a:rPr lang="fi-FI" sz="2400" dirty="0" smtClean="0"/>
+              <a:t> </a:t>
+            </a:r>
+            <a:r>
+              <a:rPr lang="fi-FI" sz="2400" dirty="0" err="1" smtClean="0"/>
+              <a:t>was</a:t>
+            </a:r>
+            <a:r>
+              <a:rPr lang="fi-FI" sz="2400" dirty="0" smtClean="0"/>
+              <a:t> </a:t>
+            </a:r>
+            <a:r>
+              <a:rPr lang="fi-FI" sz="2400" dirty="0" err="1" smtClean="0"/>
+              <a:t>assumed</a:t>
+            </a:r>
+            <a:endParaRPr lang="fi-FI" sz="2400" dirty="0" smtClean="0"/>
           </a:p>
         </p:txBody>
       </p:sp>
@@ -10134,7 +10547,7 @@
     </p:spTree>
     <p:extLst>
       <p:ext uri="{BB962C8B-B14F-4D97-AF65-F5344CB8AC3E}">
-        <p14:creationId xmlns:p14="http://schemas.microsoft.com/office/powerpoint/2010/main" val="1961641194"/>
+        <p14:creationId xmlns:p14="http://schemas.microsoft.com/office/powerpoint/2010/main" val="1030595415"/>
       </p:ext>
     </p:extLst>
   </p:cSld>

</xml_diff>

<commit_message>
[PERFECTIVE] Updated the statistics and the final report slides with new figures.
</commit_message>
<xml_diff>
--- a/Administrative/Final Report Slides.pptx
+++ b/Administrative/Final Report Slides.pptx
@@ -324,10 +324,10 @@
                   <c:v>62.85</c:v>
                 </c:pt>
                 <c:pt idx="4">
-                  <c:v>93.05</c:v>
+                  <c:v>93.55</c:v>
                 </c:pt>
                 <c:pt idx="5">
-                  <c:v>35</c:v>
+                  <c:v>55.5</c:v>
                 </c:pt>
               </c:numCache>
             </c:numRef>
@@ -342,11 +342,11 @@
           <c:showBubbleSize val="0"/>
         </c:dLbls>
         <c:gapWidth val="150"/>
-        <c:axId val="92465024"/>
-        <c:axId val="103391232"/>
+        <c:axId val="43448576"/>
+        <c:axId val="43467520"/>
       </c:barChart>
       <c:catAx>
-        <c:axId val="92465024"/>
+        <c:axId val="43448576"/>
         <c:scaling>
           <c:orientation val="minMax"/>
         </c:scaling>
@@ -374,7 +374,7 @@
         <c:majorTickMark val="out"/>
         <c:minorTickMark val="none"/>
         <c:tickLblPos val="nextTo"/>
-        <c:crossAx val="103391232"/>
+        <c:crossAx val="43467520"/>
         <c:crosses val="autoZero"/>
         <c:auto val="1"/>
         <c:lblAlgn val="ctr"/>
@@ -382,7 +382,7 @@
         <c:noMultiLvlLbl val="0"/>
       </c:catAx>
       <c:valAx>
-        <c:axId val="103391232"/>
+        <c:axId val="43467520"/>
         <c:scaling>
           <c:orientation val="minMax"/>
         </c:scaling>
@@ -412,7 +412,7 @@
         <c:majorTickMark val="out"/>
         <c:minorTickMark val="none"/>
         <c:tickLblPos val="nextTo"/>
-        <c:crossAx val="92465024"/>
+        <c:crossAx val="43448576"/>
         <c:crosses val="autoZero"/>
         <c:crossBetween val="between"/>
       </c:valAx>
@@ -558,16 +558,16 @@
                 <c:formatCode>General</c:formatCode>
                 <c:ptCount val="7"/>
                 <c:pt idx="0">
-                  <c:v>85.3</c:v>
+                  <c:v>96.3</c:v>
                 </c:pt>
                 <c:pt idx="1">
-                  <c:v>35</c:v>
+                  <c:v>41</c:v>
                 </c:pt>
                 <c:pt idx="2">
                   <c:v>19</c:v>
                 </c:pt>
                 <c:pt idx="3">
-                  <c:v>84.25</c:v>
+                  <c:v>88.25</c:v>
                 </c:pt>
                 <c:pt idx="4">
                   <c:v>37.75</c:v>
@@ -700,11 +700,11 @@
           <c:showBubbleSize val="0"/>
         </c:dLbls>
         <c:gapWidth val="150"/>
-        <c:axId val="103296000"/>
-        <c:axId val="103298176"/>
+        <c:axId val="43498112"/>
+        <c:axId val="43743872"/>
       </c:barChart>
       <c:catAx>
-        <c:axId val="103296000"/>
+        <c:axId val="43498112"/>
         <c:scaling>
           <c:orientation val="minMax"/>
         </c:scaling>
@@ -732,7 +732,7 @@
         <c:majorTickMark val="none"/>
         <c:minorTickMark val="none"/>
         <c:tickLblPos val="nextTo"/>
-        <c:crossAx val="103298176"/>
+        <c:crossAx val="43743872"/>
         <c:crosses val="autoZero"/>
         <c:auto val="1"/>
         <c:lblAlgn val="ctr"/>
@@ -740,7 +740,7 @@
         <c:noMultiLvlLbl val="0"/>
       </c:catAx>
       <c:valAx>
-        <c:axId val="103298176"/>
+        <c:axId val="43743872"/>
         <c:scaling>
           <c:orientation val="minMax"/>
         </c:scaling>
@@ -770,7 +770,7 @@
         <c:majorTickMark val="none"/>
         <c:minorTickMark val="none"/>
         <c:tickLblPos val="nextTo"/>
-        <c:crossAx val="103296000"/>
+        <c:crossAx val="43498112"/>
         <c:crosses val="autoZero"/>
         <c:crossBetween val="between"/>
       </c:valAx>
@@ -873,7 +873,7 @@
             <a:fld id="{448AE8FB-2A88-455E-B24C-E27AB594F61E}" type="datetimeFigureOut">
               <a:rPr lang="en-US" smtClean="0"/>
               <a:pPr/>
-              <a:t>4/30/2013</a:t>
+              <a:t>5/2/2013</a:t>
             </a:fld>
             <a:endParaRPr lang="en-US"/>
           </a:p>
@@ -5654,21 +5654,21 @@
       </p:sp>
       <p:graphicFrame>
         <p:nvGraphicFramePr>
-          <p:cNvPr id="7" name="Chart 6"/>
+          <p:cNvPr id="6" name="Chart 5"/>
           <p:cNvGraphicFramePr>
             <a:graphicFrameLocks/>
           </p:cNvGraphicFramePr>
           <p:nvPr>
             <p:extLst>
               <p:ext uri="{D42A27DB-BD31-4B8C-83A1-F6EECF244321}">
-                <p14:modId xmlns:p14="http://schemas.microsoft.com/office/powerpoint/2010/main" val="2077561058"/>
+                <p14:modId xmlns:p14="http://schemas.microsoft.com/office/powerpoint/2010/main" val="653076197"/>
               </p:ext>
             </p:extLst>
           </p:nvPr>
         </p:nvGraphicFramePr>
         <p:xfrm>
-          <a:off x="1115616" y="1196752"/>
-          <a:ext cx="7560840" cy="5040560"/>
+          <a:off x="1187624" y="1124744"/>
+          <a:ext cx="7488832" cy="5040560"/>
         </p:xfrm>
         <a:graphic>
           <a:graphicData uri="http://schemas.openxmlformats.org/drawingml/2006/chart">
@@ -5769,21 +5769,21 @@
       </p:sp>
       <p:graphicFrame>
         <p:nvGraphicFramePr>
-          <p:cNvPr id="8" name="Chart 7"/>
+          <p:cNvPr id="6" name="Chart 5"/>
           <p:cNvGraphicFramePr>
             <a:graphicFrameLocks/>
           </p:cNvGraphicFramePr>
           <p:nvPr>
             <p:extLst>
               <p:ext uri="{D42A27DB-BD31-4B8C-83A1-F6EECF244321}">
-                <p14:modId xmlns:p14="http://schemas.microsoft.com/office/powerpoint/2010/main" val="544987095"/>
+                <p14:modId xmlns:p14="http://schemas.microsoft.com/office/powerpoint/2010/main" val="2632891483"/>
               </p:ext>
             </p:extLst>
           </p:nvPr>
         </p:nvGraphicFramePr>
         <p:xfrm>
-          <a:off x="899592" y="1196752"/>
-          <a:ext cx="7776864" cy="5040560"/>
+          <a:off x="899592" y="1052736"/>
+          <a:ext cx="7776864" cy="5256584"/>
         </p:xfrm>
         <a:graphic>
           <a:graphicData uri="http://schemas.openxmlformats.org/drawingml/2006/chart">
@@ -9712,7 +9712,7 @@
       </p:sp>
       <p:pic>
         <p:nvPicPr>
-          <p:cNvPr id="1028" name="Picture 4"/>
+          <p:cNvPr id="1027" name="Picture 3"/>
           <p:cNvPicPr>
             <a:picLocks noChangeAspect="1" noChangeArrowheads="1"/>
           </p:cNvPicPr>
@@ -9733,8 +9733,8 @@
         </p:blipFill>
         <p:spPr bwMode="auto">
           <a:xfrm>
-            <a:off x="807046" y="958688"/>
-            <a:ext cx="7921655" cy="5496980"/>
+            <a:off x="590321" y="1340768"/>
+            <a:ext cx="8388931" cy="4971218"/>
           </a:xfrm>
           <a:prstGeom prst="rect">
             <a:avLst/>

</xml_diff>